<commit_message>
Added waterfall model and diagram
</commit_message>
<xml_diff>
--- a/Presentations/Proposal Format.pptx
+++ b/Presentations/Proposal Format.pptx
@@ -283,6 +283,87 @@
     </p:ext>
   </p:extLst>
 </p:presentation>
+</file>
+
+<file path=ppt/ink/ink1.xml><?xml version="1.0" encoding="utf-8"?>
+<inkml:ink xmlns:inkml="http://www.w3.org/2003/InkML">
+  <inkml:definitions>
+    <inkml:context xml:id="ctx0">
+      <inkml:inkSource xml:id="inkSrc0">
+        <inkml:traceFormat>
+          <inkml:channel name="X" type="integer" min="-2.14748E9" max="2.14748E9" units="cm"/>
+          <inkml:channel name="Y" type="integer" min="-2.14748E9" max="2.14748E9" units="cm"/>
+          <inkml:channel name="F" type="integer" max="32767" units="dev"/>
+        </inkml:traceFormat>
+        <inkml:channelProperties>
+          <inkml:channelProperty channel="X" name="resolution" value="1000" units="1/cm"/>
+          <inkml:channelProperty channel="Y" name="resolution" value="1000" units="1/cm"/>
+          <inkml:channelProperty channel="F" name="resolution" value="0" units="1/dev"/>
+        </inkml:channelProperties>
+      </inkml:inkSource>
+      <inkml:timestamp xml:id="ts0" timeString="2025-11-29T06:57:43.685"/>
+    </inkml:context>
+    <inkml:brush xml:id="br0">
+      <inkml:brushProperty name="width" value="0.035" units="cm"/>
+      <inkml:brushProperty name="height" value="0.035" units="cm"/>
+    </inkml:brush>
+  </inkml:definitions>
+  <inkml:trace contextRef="#ctx0" brushRef="#br0">2 11461 24575,'-1'105'0,"3"113"0,-2-216 0,0-1 0,0 1 0,0-1 0,0 1 0,0-1 0,0 0 0,0 1 0,1-1 0,-1 1 0,1-1 0,-1 0 0,1 1 0,-1-1 0,1 0 0,0 0 0,-1 1 0,1-1 0,0 0 0,0 0 0,0 0 0,0 0 0,0 0 0,0 0 0,0 0 0,1 0 0,-1-1 0,0 1 0,0 0 0,1-1 0,-1 1 0,0-1 0,1 1 0,-1-1 0,0 0 0,1 1 0,-1-1 0,1 0 0,-1 0 0,1 0 0,-1 0 0,0 0 0,1 0 0,-1-1 0,1 1 0,-1 0 0,0-1 0,2 0 0,8-3 0,-1 0 0,-1-1 0,1 0 0,16-12 0,-21 14 0,0-1 0,1 1 0,0 1 0,0-1 0,1 1 0,-1 0 0,0 0 0,1 1 0,-1 0 0,13-1 0,64 4 0,-42 0 0,684-1 0,-580 9 0,4 0 0,-13-11 0,159 2 0,-193 9 0,34 0 0,41-11 0,132 2 0,-209 9 0,32 0 0,40-12 0,198 4 0,-340 2 0,60 13 0,-55-8 0,36 3 0,-60-11 0,0 0 0,0-1 0,1-1 0,-1 1 0,0-2 0,0 1 0,16-6 0,-26 7 0,1-1 0,0 1 0,-1-1 0,1 0 0,-1 0 0,1 1 0,-1-1 0,0 0 0,1 0 0,-1 0 0,0-1 0,0 1 0,1 0 0,-1 0 0,0-1 0,0 1 0,-1-1 0,1 1 0,0-1 0,0 1 0,-1-1 0,1 1 0,-1-1 0,1 0 0,-1-1 0,1-4 0,-1-1 0,0 1 0,0 0 0,-2-14 0,-1-3 0,2-93 0,5 1 0,20-122 0,1 3 0,-15 144 0,31-117 0,-21 118 0,12-124 0,-16 50 0,5-100 0,-21-544 0,-1 359 0,-9 256 0,0 16 0,9-805 0,2 473 0,9 342 0,1 6 0,4-249 0,-9 118 0,-8 191 0,11-110 0,40-237 0,-46 420 0,-1 0 0,-1 0 0,-1 0 0,-2 0 0,0 0 0,-12-48 0,12 65 0,1 1 0,0 0 0,1-1 0,0 1 0,0-1 0,1 1 0,3-14 0,1-18 0,6-757 0,-13 496 0,2-1344 0,10 1469 0,1-8 0,-8 112 0,3-1 0,28-128 0,-23 125 0,2-157 0,-8 81 0,6 9 0,7-233 0,-20 299 0,3-86 0,-1 164 0,0 0 0,0 0 0,0 0 0,1 0 0,-1 0 0,0 1 0,0-1 0,0 0 0,1 0 0,-1 0 0,0 0 0,1 0 0,-1 0 0,1 1 0,-1-1 0,1 0 0,0 0 0,-1 1 0,1-1 0,-1 0 0,1 1 0,0-1 0,0 1 0,-1-1 0,1 1 0,0-1 0,0 1 0,0-1 0,0 1 0,0 0 0,0 0 0,-1-1 0,1 1 0,0 0 0,0 0 0,0 0 0,0 0 0,0 0 0,0 0 0,0 0 0,0 0 0,1 1 0,6 1 0,0 0 0,0 1 0,0 0 0,10 6 0,6 2 0,-3-5 0,0-1 0,0 0 0,0-2 0,30 1 0,91-6 0,-53 0 0,371 2 0,-444 1 0,0 1 0,0 1 0,0 0 0,24 8 0,-21-5 0,0-1 0,29 3 0,48-5 0,-66-4 0,0 2 0,41 5 0,36 11 0,61 11 0,-133-22 0,1-2 0,0-1 0,0-2 0,44-4 0,4 0 0,514 3 0,-564-1 0,41-8 0,25-1 0,-47 11 0,97 14 0,-118-13 0,18 5 0,-50-7-34,1 0 0,-1 0 0,1 0 0,-1 0 0,1 0-1,-1 0 1,0 0 0,1 0 0,-1 0 0,1 0 0,-1 1 0,0-1 0,1 0-1,-1 0 1,1 1 0,-1-1 0,0 0 0,1 0 0,-1 1 0,0-1-1,0 0 1,1 1 0,-1-1 0,0 1 0,0-1 0,1 0 0,-1 1 0,0-1-1,0 1 1,0-1 0,0 0 0,0 1 0,0-1 0,0 1 0,1-1 0,-1 1-1,0-1 1,-1 1 0,1 0 0,-3 6-6792</inkml:trace>
+</inkml:ink>
+</file>
+
+<file path=ppt/ink/ink2.xml><?xml version="1.0" encoding="utf-8"?>
+<inkml:ink xmlns:inkml="http://www.w3.org/2003/InkML">
+  <inkml:definitions>
+    <inkml:context xml:id="ctx0">
+      <inkml:inkSource xml:id="inkSrc0">
+        <inkml:traceFormat>
+          <inkml:channel name="X" type="integer" min="-2.14748E9" max="2.14748E9" units="cm"/>
+          <inkml:channel name="Y" type="integer" min="-2.14748E9" max="2.14748E9" units="cm"/>
+          <inkml:channel name="F" type="integer" max="32767" units="dev"/>
+        </inkml:traceFormat>
+        <inkml:channelProperties>
+          <inkml:channelProperty channel="X" name="resolution" value="1000" units="1/cm"/>
+          <inkml:channelProperty channel="Y" name="resolution" value="1000" units="1/cm"/>
+          <inkml:channelProperty channel="F" name="resolution" value="0" units="1/dev"/>
+        </inkml:channelProperties>
+      </inkml:inkSource>
+      <inkml:timestamp xml:id="ts0" timeString="2025-11-29T06:57:46.082"/>
+    </inkml:context>
+    <inkml:brush xml:id="br0">
+      <inkml:brushProperty name="width" value="0.035" units="cm"/>
+      <inkml:brushProperty name="height" value="0.035" units="cm"/>
+    </inkml:brush>
+  </inkml:definitions>
+  <inkml:trace contextRef="#ctx0" brushRef="#br0">1 0 24575,'0'500'0,"1"-473"0,2 0 0,12 52 0,-8-49 0,5 52 0,-9-2-1365</inkml:trace>
+</inkml:ink>
+</file>
+
+<file path=ppt/ink/ink3.xml><?xml version="1.0" encoding="utf-8"?>
+<inkml:ink xmlns:inkml="http://www.w3.org/2003/InkML">
+  <inkml:definitions>
+    <inkml:context xml:id="ctx0">
+      <inkml:inkSource xml:id="inkSrc0">
+        <inkml:traceFormat>
+          <inkml:channel name="X" type="integer" min="-2.14748E9" max="2.14748E9" units="cm"/>
+          <inkml:channel name="Y" type="integer" min="-2.14748E9" max="2.14748E9" units="cm"/>
+          <inkml:channel name="F" type="integer" max="32767" units="dev"/>
+        </inkml:traceFormat>
+        <inkml:channelProperties>
+          <inkml:channelProperty channel="X" name="resolution" value="1000" units="1/cm"/>
+          <inkml:channelProperty channel="Y" name="resolution" value="1000" units="1/cm"/>
+          <inkml:channelProperty channel="F" name="resolution" value="0" units="1/dev"/>
+        </inkml:channelProperties>
+      </inkml:inkSource>
+      <inkml:timestamp xml:id="ts0" timeString="2025-11-29T06:57:50.542"/>
+    </inkml:context>
+    <inkml:brush xml:id="br0">
+      <inkml:brushProperty name="width" value="0.035" units="cm"/>
+      <inkml:brushProperty name="height" value="0.035" units="cm"/>
+    </inkml:brush>
+  </inkml:definitions>
+  <inkml:trace contextRef="#ctx0" brushRef="#br0">1 75 24575,'2'1'0,"1"-1"0,-1 1 0,1 0 0,-1 0 0,1 0 0,-1 1 0,0-1 0,0 1 0,1-1 0,-1 1 0,0 0 0,-1-1 0,1 1 0,3 4 0,21 29 0,-17-23 0,13 23 0,51 58 0,-63-79 0,0 0 0,0 0 0,10 23 0,-5-9 0,-14-28 0,-1 1 0,0 0 0,0-1 0,1 1 0,-1-1 0,1 1 0,-1-1 0,0 1 0,1-1 0,-1 0 0,1 1 0,-1-1 0,1 1 0,-1-1 0,1 0 0,-1 1 0,1-1 0,-1 0 0,1 0 0,0 1 0,-1-1 0,1 0 0,-1 0 0,1 0 0,0 0 0,-1 0 0,1 0 0,-1 0 0,2 0 0,14-12 0,6-25 0,-10 10 0,2 1 0,0 0 0,1 1 0,2 0 0,29-33 0,6-2 60,-34 38-773,39-38 1,-42 48-6114</inkml:trace>
+</inkml:ink>
 </file>
 
 <file path=ppt/notesMasters/notesMaster1.xml><?xml version="1.0" encoding="utf-8"?>
@@ -2003,7 +2084,7 @@
         </p:nvSpPr>
         <p:spPr>
           <a:xfrm>
-            <a:off x="381300" y="685800"/>
+            <a:off x="381000" y="685800"/>
             <a:ext cx="6096000" cy="3429000"/>
           </a:xfrm>
           <a:custGeom>
@@ -8278,10 +8359,10 @@
               <a:buNone/>
             </a:pPr>
             <a:r>
-              <a:rPr lang="en"/>
+              <a:rPr lang="en" dirty="0"/>
               <a:t>Proposed Methodology</a:t>
             </a:r>
-            <a:endParaRPr/>
+            <a:endParaRPr dirty="0"/>
           </a:p>
         </p:txBody>
       </p:sp>
@@ -8321,10 +8402,9 @@
               <a:buChar char="●"/>
             </a:pPr>
             <a:r>
-              <a:rPr lang="en"/>
-              <a:t>Approach (e.g., Waterfall, Agile, Spiral, etc.)</a:t>
+              <a:rPr lang="en-US" dirty="0"/>
+              <a:t>Waterfall model</a:t>
             </a:r>
-            <a:endParaRPr/>
           </a:p>
           <a:p>
             <a:pPr marL="457200" lvl="0" indent="-342900" algn="l" rtl="0">
@@ -8338,13 +8418,246 @@
               <a:buChar char="●"/>
             </a:pPr>
             <a:r>
-              <a:rPr lang="en"/>
-              <a:t>Outline of Development Stages (In diagram)</a:t>
+              <a:rPr lang="en-US" dirty="0"/>
+              <a:t>Outline of Development Stages :</a:t>
             </a:r>
-            <a:endParaRPr/>
           </a:p>
         </p:txBody>
       </p:sp>
+      <p:pic>
+        <p:nvPicPr>
+          <p:cNvPr id="5" name="Picture 4">
+            <a:extLst>
+              <a:ext uri="{FF2B5EF4-FFF2-40B4-BE49-F238E27FC236}">
+                <a16:creationId xmlns:a16="http://schemas.microsoft.com/office/drawing/2014/main" id="{C1547091-611D-6140-14B8-FFD0E9FA675B}"/>
+              </a:ext>
+            </a:extLst>
+          </p:cNvPr>
+          <p:cNvPicPr>
+            <a:picLocks noChangeAspect="1"/>
+          </p:cNvPicPr>
+          <p:nvPr/>
+        </p:nvPicPr>
+        <p:blipFill>
+          <a:blip r:embed="rId3"/>
+          <a:stretch>
+            <a:fillRect/>
+          </a:stretch>
+        </p:blipFill>
+        <p:spPr>
+          <a:xfrm>
+            <a:off x="3808927" y="-188686"/>
+            <a:ext cx="2272892" cy="5143500"/>
+          </a:xfrm>
+          <a:prstGeom prst="rect">
+            <a:avLst/>
+          </a:prstGeom>
+        </p:spPr>
+      </p:pic>
+      <p:pic>
+        <p:nvPicPr>
+          <p:cNvPr id="7" name="Picture 6">
+            <a:extLst>
+              <a:ext uri="{FF2B5EF4-FFF2-40B4-BE49-F238E27FC236}">
+                <a16:creationId xmlns:a16="http://schemas.microsoft.com/office/drawing/2014/main" id="{F42DF188-94B6-E2E9-928F-550F37DBCB46}"/>
+              </a:ext>
+            </a:extLst>
+          </p:cNvPr>
+          <p:cNvPicPr>
+            <a:picLocks noChangeAspect="1"/>
+          </p:cNvPicPr>
+          <p:nvPr/>
+        </p:nvPicPr>
+        <p:blipFill>
+          <a:blip r:embed="rId4"/>
+          <a:stretch>
+            <a:fillRect/>
+          </a:stretch>
+        </p:blipFill>
+        <p:spPr>
+          <a:xfrm>
+            <a:off x="6047163" y="1164716"/>
+            <a:ext cx="2819794" cy="3924848"/>
+          </a:xfrm>
+          <a:prstGeom prst="rect">
+            <a:avLst/>
+          </a:prstGeom>
+        </p:spPr>
+      </p:pic>
+      <p:grpSp>
+        <p:nvGrpSpPr>
+          <p:cNvPr id="16" name="Group 15">
+            <a:extLst>
+              <a:ext uri="{FF2B5EF4-FFF2-40B4-BE49-F238E27FC236}">
+                <a16:creationId xmlns:a16="http://schemas.microsoft.com/office/drawing/2014/main" id="{B0CF27F1-FAFD-EBC5-07AA-0F5819AFF734}"/>
+              </a:ext>
+            </a:extLst>
+          </p:cNvPr>
+          <p:cNvGrpSpPr/>
+          <p:nvPr/>
+        </p:nvGrpSpPr>
+        <p:grpSpPr>
+          <a:xfrm>
+            <a:off x="4962886" y="823240"/>
+            <a:ext cx="2642760" cy="4272480"/>
+            <a:chOff x="4962886" y="823240"/>
+            <a:chExt cx="2642760" cy="4272480"/>
+          </a:xfrm>
+        </p:grpSpPr>
+        <mc:AlternateContent xmlns:mc="http://schemas.openxmlformats.org/markup-compatibility/2006">
+          <mc:Choice xmlns:p14="http://schemas.microsoft.com/office/powerpoint/2010/main" Requires="p14">
+            <p:contentPart p14:bwMode="auto" r:id="rId5">
+              <p14:nvContentPartPr>
+                <p14:cNvPr id="12" name="Ink 11">
+                  <a:extLst>
+                    <a:ext uri="{FF2B5EF4-FFF2-40B4-BE49-F238E27FC236}">
+                      <a16:creationId xmlns:a16="http://schemas.microsoft.com/office/drawing/2014/main" id="{92029F67-B535-7F61-A3DF-E25DCA54E96E}"/>
+                    </a:ext>
+                  </a:extLst>
+                </p14:cNvPr>
+                <p14:cNvContentPartPr/>
+                <p14:nvPr/>
+              </p14:nvContentPartPr>
+              <p14:xfrm>
+                <a:off x="4962886" y="823240"/>
+                <a:ext cx="2535840" cy="4272480"/>
+              </p14:xfrm>
+            </p:contentPart>
+          </mc:Choice>
+          <mc:Fallback>
+            <p:pic>
+              <p:nvPicPr>
+                <p:cNvPr id="12" name="Ink 11">
+                  <a:extLst>
+                    <a:ext uri="{FF2B5EF4-FFF2-40B4-BE49-F238E27FC236}">
+                      <a16:creationId xmlns:a16="http://schemas.microsoft.com/office/drawing/2014/main" id="{92029F67-B535-7F61-A3DF-E25DCA54E96E}"/>
+                    </a:ext>
+                  </a:extLst>
+                </p:cNvPr>
+                <p:cNvPicPr/>
+                <p:nvPr/>
+              </p:nvPicPr>
+              <p:blipFill>
+                <a:blip r:embed="rId6"/>
+                <a:stretch>
+                  <a:fillRect/>
+                </a:stretch>
+              </p:blipFill>
+              <p:spPr>
+                <a:xfrm>
+                  <a:off x="4956766" y="817120"/>
+                  <a:ext cx="2548080" cy="4284720"/>
+                </a:xfrm>
+                <a:prstGeom prst="rect">
+                  <a:avLst/>
+                </a:prstGeom>
+              </p:spPr>
+            </p:pic>
+          </mc:Fallback>
+        </mc:AlternateContent>
+        <mc:AlternateContent xmlns:mc="http://schemas.openxmlformats.org/markup-compatibility/2006">
+          <mc:Choice xmlns:p14="http://schemas.microsoft.com/office/powerpoint/2010/main" Requires="p14">
+            <p:contentPart p14:bwMode="auto" r:id="rId7">
+              <p14:nvContentPartPr>
+                <p14:cNvPr id="13" name="Ink 12">
+                  <a:extLst>
+                    <a:ext uri="{FF2B5EF4-FFF2-40B4-BE49-F238E27FC236}">
+                      <a16:creationId xmlns:a16="http://schemas.microsoft.com/office/drawing/2014/main" id="{24F96AA7-1132-F62D-F16C-EB0A1DD6122E}"/>
+                    </a:ext>
+                  </a:extLst>
+                </p14:cNvPr>
+                <p14:cNvContentPartPr/>
+                <p14:nvPr/>
+              </p14:nvContentPartPr>
+              <p14:xfrm>
+                <a:off x="7489006" y="885160"/>
+                <a:ext cx="15120" cy="297360"/>
+              </p14:xfrm>
+            </p:contentPart>
+          </mc:Choice>
+          <mc:Fallback>
+            <p:pic>
+              <p:nvPicPr>
+                <p:cNvPr id="13" name="Ink 12">
+                  <a:extLst>
+                    <a:ext uri="{FF2B5EF4-FFF2-40B4-BE49-F238E27FC236}">
+                      <a16:creationId xmlns:a16="http://schemas.microsoft.com/office/drawing/2014/main" id="{24F96AA7-1132-F62D-F16C-EB0A1DD6122E}"/>
+                    </a:ext>
+                  </a:extLst>
+                </p:cNvPr>
+                <p:cNvPicPr/>
+                <p:nvPr/>
+              </p:nvPicPr>
+              <p:blipFill>
+                <a:blip r:embed="rId8"/>
+                <a:stretch>
+                  <a:fillRect/>
+                </a:stretch>
+              </p:blipFill>
+              <p:spPr>
+                <a:xfrm>
+                  <a:off x="7482886" y="879040"/>
+                  <a:ext cx="27360" cy="309600"/>
+                </a:xfrm>
+                <a:prstGeom prst="rect">
+                  <a:avLst/>
+                </a:prstGeom>
+              </p:spPr>
+            </p:pic>
+          </mc:Fallback>
+        </mc:AlternateContent>
+        <mc:AlternateContent xmlns:mc="http://schemas.openxmlformats.org/markup-compatibility/2006">
+          <mc:Choice xmlns:p14="http://schemas.microsoft.com/office/powerpoint/2010/main" Requires="p14">
+            <p:contentPart p14:bwMode="auto" r:id="rId9">
+              <p14:nvContentPartPr>
+                <p14:cNvPr id="15" name="Ink 14">
+                  <a:extLst>
+                    <a:ext uri="{FF2B5EF4-FFF2-40B4-BE49-F238E27FC236}">
+                      <a16:creationId xmlns:a16="http://schemas.microsoft.com/office/drawing/2014/main" id="{C5884200-8109-482C-8355-ECC18480CC16}"/>
+                    </a:ext>
+                  </a:extLst>
+                </p14:cNvPr>
+                <p14:cNvContentPartPr/>
+                <p14:nvPr/>
+              </p14:nvContentPartPr>
+              <p14:xfrm>
+                <a:off x="7409086" y="1010800"/>
+                <a:ext cx="196560" cy="140760"/>
+              </p14:xfrm>
+            </p:contentPart>
+          </mc:Choice>
+          <mc:Fallback>
+            <p:pic>
+              <p:nvPicPr>
+                <p:cNvPr id="15" name="Ink 14">
+                  <a:extLst>
+                    <a:ext uri="{FF2B5EF4-FFF2-40B4-BE49-F238E27FC236}">
+                      <a16:creationId xmlns:a16="http://schemas.microsoft.com/office/drawing/2014/main" id="{C5884200-8109-482C-8355-ECC18480CC16}"/>
+                    </a:ext>
+                  </a:extLst>
+                </p:cNvPr>
+                <p:cNvPicPr/>
+                <p:nvPr/>
+              </p:nvPicPr>
+              <p:blipFill>
+                <a:blip r:embed="rId10"/>
+                <a:stretch>
+                  <a:fillRect/>
+                </a:stretch>
+              </p:blipFill>
+              <p:spPr>
+                <a:xfrm>
+                  <a:off x="7402966" y="1004680"/>
+                  <a:ext cx="208800" cy="153000"/>
+                </a:xfrm>
+                <a:prstGeom prst="rect">
+                  <a:avLst/>
+                </a:prstGeom>
+              </p:spPr>
+            </p:pic>
+          </mc:Fallback>
+        </mc:AlternateContent>
+      </p:grpSp>
     </p:spTree>
   </p:cSld>
   <p:clrMapOvr>
@@ -8627,6 +8940,22 @@
             </a:pPr>
             <a:r>
               <a:rPr lang="en-US" dirty="0"/>
+              <a:t>Successful user and admin log in</a:t>
+            </a:r>
+          </a:p>
+          <a:p>
+            <a:pPr marL="457200" lvl="0" indent="-342900" algn="l" rtl="0">
+              <a:spcBef>
+                <a:spcPts val="0"/>
+              </a:spcBef>
+              <a:spcAft>
+                <a:spcPts val="0"/>
+              </a:spcAft>
+              <a:buSzPts val="1800"/>
+              <a:buChar char="●"/>
+            </a:pPr>
+            <a:r>
+              <a:rPr lang="en-US" dirty="0"/>
               <a:t>Correct anonymity toggle</a:t>
             </a:r>
           </a:p>
@@ -8644,6 +8973,38 @@
             <a:r>
               <a:rPr lang="en-US" dirty="0"/>
               <a:t>Successful submission</a:t>
+            </a:r>
+          </a:p>
+          <a:p>
+            <a:pPr marL="457200" lvl="0" indent="-342900" algn="l" rtl="0">
+              <a:spcBef>
+                <a:spcPts val="0"/>
+              </a:spcBef>
+              <a:spcAft>
+                <a:spcPts val="0"/>
+              </a:spcAft>
+              <a:buSzPts val="1800"/>
+              <a:buChar char="●"/>
+            </a:pPr>
+            <a:r>
+              <a:rPr lang="en-US" dirty="0"/>
+              <a:t>Successfully viewing feedbacks that were submitted by the users sharing a common group</a:t>
+            </a:r>
+          </a:p>
+          <a:p>
+            <a:pPr marL="457200" lvl="0" indent="-342900" algn="l" rtl="0">
+              <a:spcBef>
+                <a:spcPts val="0"/>
+              </a:spcBef>
+              <a:spcAft>
+                <a:spcPts val="0"/>
+              </a:spcAft>
+              <a:buSzPts val="1800"/>
+              <a:buChar char="●"/>
+            </a:pPr>
+            <a:r>
+              <a:rPr lang="en-US" dirty="0"/>
+              <a:t>Successful administrative actions such as deleting feedbacks and users</a:t>
             </a:r>
             <a:endParaRPr dirty="0"/>
           </a:p>

</xml_diff>

<commit_message>
Edited presentation and report slightly
</commit_message>
<xml_diff>
--- a/Presentations/Proposal Format.pptx
+++ b/Presentations/Proposal Format.pptx
@@ -300,289 +300,14 @@
           <inkml:channelProperty channel="F" name="resolution" value="0" units="1/dev"/>
         </inkml:channelProperties>
       </inkml:inkSource>
-      <inkml:timestamp xml:id="ts0" timeString="2025-11-30T05:20:23.391"/>
-    </inkml:context>
-    <inkml:brush xml:id="br0">
-      <inkml:brushProperty name="width" value="0.35" units="cm"/>
-      <inkml:brushProperty name="height" value="0.35" units="cm"/>
-      <inkml:brushProperty name="color" value="#FFFFFF"/>
-    </inkml:brush>
-  </inkml:definitions>
-  <inkml:trace contextRef="#ctx0" brushRef="#br0">1 2261 24575,'14'0'0,"-1"-1"0,1-1 0,-1-1 0,0 0 0,0 0 0,25-11 0,73-42 0,-52 24 0,12-3 0,84-29 0,219-50 0,-321 98 0,-2-2 0,77-38 0,-6 1 0,-100 45 0,-1-1 0,0-1 0,22-17 0,19-12 0,261-122 0,-208 114 0,100-40 0,-99 45 0,189-69 0,-176 80 0,4 0 0,-30-1 0,178-67 0,-3 4 0,-99 39 0,-27 15 0,0 0 0,157-82 0,-153 59 0,153-41 0,-36 13 0,-238 83 0,0 2 0,0 2 0,0 0 0,62-2 0,5-1 0,-93 9 0,442-67 0,-348 49 0,192-61 0,-261 66 0,36-21 0,5-1 0,106-44 0,-150 73 0,-30 7 0,-1 0 0,0 0 0,1 0 0,-1 0 0,0 0 0,1 0 0,-1 0 0,1 0 0,-1 0 0,0 0 0,1 1 0,-1-1 0,0 0 0,1 0 0,-1 0 0,0 0 0,0 1 0,1-1 0,-1 0 0,0 0 0,1 1 0,-1-1 0,0 0 0,0 1 0,0-1 0,1 1 0,-6 15 0,-13 7 0,-1-1 0,-1 0 0,-1-1 0,-44 33 0,0 2 0,41-33 0,-20 18 0,-2-1 0,-94 63 0,88-70-1365</inkml:trace>
-</inkml:ink>
-</file>
-
-<file path=ppt/ink/ink10.xml><?xml version="1.0" encoding="utf-8"?>
-<inkml:ink xmlns:inkml="http://www.w3.org/2003/InkML">
-  <inkml:definitions>
-    <inkml:context xml:id="ctx0">
-      <inkml:inkSource xml:id="inkSrc0">
-        <inkml:traceFormat>
-          <inkml:channel name="X" type="integer" min="-2.14748E9" max="2.14748E9" units="cm"/>
-          <inkml:channel name="Y" type="integer" min="-2.14748E9" max="2.14748E9" units="cm"/>
-          <inkml:channel name="F" type="integer" max="32767" units="dev"/>
-        </inkml:traceFormat>
-        <inkml:channelProperties>
-          <inkml:channelProperty channel="X" name="resolution" value="1000" units="1/cm"/>
-          <inkml:channelProperty channel="Y" name="resolution" value="1000" units="1/cm"/>
-          <inkml:channelProperty channel="F" name="resolution" value="0" units="1/dev"/>
-        </inkml:channelProperties>
-      </inkml:inkSource>
-      <inkml:timestamp xml:id="ts0" timeString="2025-11-30T05:20:55.887"/>
-    </inkml:context>
-    <inkml:brush xml:id="br0">
-      <inkml:brushProperty name="width" value="0.35" units="cm"/>
-      <inkml:brushProperty name="height" value="0.35" units="cm"/>
-      <inkml:brushProperty name="color" value="#FFFFFF"/>
-    </inkml:brush>
-  </inkml:definitions>
-  <inkml:trace contextRef="#ctx0" brushRef="#br0">0 0 24575</inkml:trace>
-</inkml:ink>
-</file>
-
-<file path=ppt/ink/ink11.xml><?xml version="1.0" encoding="utf-8"?>
-<inkml:ink xmlns:inkml="http://www.w3.org/2003/InkML">
-  <inkml:definitions>
-    <inkml:context xml:id="ctx0">
-      <inkml:inkSource xml:id="inkSrc0">
-        <inkml:traceFormat>
-          <inkml:channel name="X" type="integer" min="-2.14748E9" max="2.14748E9" units="cm"/>
-          <inkml:channel name="Y" type="integer" min="-2.14748E9" max="2.14748E9" units="cm"/>
-          <inkml:channel name="F" type="integer" max="32767" units="dev"/>
-        </inkml:traceFormat>
-        <inkml:channelProperties>
-          <inkml:channelProperty channel="X" name="resolution" value="1000" units="1/cm"/>
-          <inkml:channelProperty channel="Y" name="resolution" value="1000" units="1/cm"/>
-          <inkml:channelProperty channel="F" name="resolution" value="0" units="1/dev"/>
-        </inkml:channelProperties>
-      </inkml:inkSource>
-      <inkml:timestamp xml:id="ts0" timeString="2025-11-30T05:21:18.127"/>
-    </inkml:context>
-    <inkml:brush xml:id="br0">
-      <inkml:brushProperty name="width" value="0.35" units="cm"/>
-      <inkml:brushProperty name="height" value="0.35" units="cm"/>
-      <inkml:brushProperty name="color" value="#FFFFFF"/>
-    </inkml:brush>
-  </inkml:definitions>
-  <inkml:trace contextRef="#ctx0" brushRef="#br0">0 1 24575,'0'0'-8191</inkml:trace>
-</inkml:ink>
-</file>
-
-<file path=ppt/ink/ink12.xml><?xml version="1.0" encoding="utf-8"?>
-<inkml:ink xmlns:inkml="http://www.w3.org/2003/InkML">
-  <inkml:definitions>
-    <inkml:context xml:id="ctx0">
-      <inkml:inkSource xml:id="inkSrc0">
-        <inkml:traceFormat>
-          <inkml:channel name="X" type="integer" min="-2.14748E9" max="2.14748E9" units="cm"/>
-          <inkml:channel name="Y" type="integer" min="-2.14748E9" max="2.14748E9" units="cm"/>
-          <inkml:channel name="F" type="integer" max="32767" units="dev"/>
-        </inkml:traceFormat>
-        <inkml:channelProperties>
-          <inkml:channelProperty channel="X" name="resolution" value="1000" units="1/cm"/>
-          <inkml:channelProperty channel="Y" name="resolution" value="1000" units="1/cm"/>
-          <inkml:channelProperty channel="F" name="resolution" value="0" units="1/dev"/>
-        </inkml:channelProperties>
-      </inkml:inkSource>
-      <inkml:timestamp xml:id="ts0" timeString="2025-11-30T05:21:18.760"/>
-    </inkml:context>
-    <inkml:brush xml:id="br0">
-      <inkml:brushProperty name="width" value="0.35" units="cm"/>
-      <inkml:brushProperty name="height" value="0.35" units="cm"/>
-      <inkml:brushProperty name="color" value="#FFFFFF"/>
-    </inkml:brush>
-  </inkml:definitions>
-  <inkml:trace contextRef="#ctx0" brushRef="#br0">1 1 24575,'0'0'-8191</inkml:trace>
-</inkml:ink>
-</file>
-
-<file path=ppt/ink/ink13.xml><?xml version="1.0" encoding="utf-8"?>
-<inkml:ink xmlns:inkml="http://www.w3.org/2003/InkML">
-  <inkml:definitions>
-    <inkml:context xml:id="ctx0">
-      <inkml:inkSource xml:id="inkSrc0">
-        <inkml:traceFormat>
-          <inkml:channel name="X" type="integer" min="-2.14748E9" max="2.14748E9" units="cm"/>
-          <inkml:channel name="Y" type="integer" min="-2.14748E9" max="2.14748E9" units="cm"/>
-          <inkml:channel name="F" type="integer" max="32767" units="dev"/>
-        </inkml:traceFormat>
-        <inkml:channelProperties>
-          <inkml:channelProperty channel="X" name="resolution" value="1000" units="1/cm"/>
-          <inkml:channelProperty channel="Y" name="resolution" value="1000" units="1/cm"/>
-          <inkml:channelProperty channel="F" name="resolution" value="0" units="1/dev"/>
-        </inkml:channelProperties>
-      </inkml:inkSource>
-      <inkml:timestamp xml:id="ts0" timeString="2025-11-30T05:21:20.240"/>
-    </inkml:context>
-    <inkml:brush xml:id="br0">
-      <inkml:brushProperty name="width" value="0.35" units="cm"/>
-      <inkml:brushProperty name="height" value="0.35" units="cm"/>
-      <inkml:brushProperty name="color" value="#FFFFFF"/>
-    </inkml:brush>
-  </inkml:definitions>
-  <inkml:trace contextRef="#ctx0" brushRef="#br0">0 0 24575,'0'0'-8191</inkml:trace>
-</inkml:ink>
-</file>
-
-<file path=ppt/ink/ink14.xml><?xml version="1.0" encoding="utf-8"?>
-<inkml:ink xmlns:inkml="http://www.w3.org/2003/InkML">
-  <inkml:definitions>
-    <inkml:context xml:id="ctx0">
-      <inkml:inkSource xml:id="inkSrc0">
-        <inkml:traceFormat>
-          <inkml:channel name="X" type="integer" min="-2.14748E9" max="2.14748E9" units="cm"/>
-          <inkml:channel name="Y" type="integer" min="-2.14748E9" max="2.14748E9" units="cm"/>
-          <inkml:channel name="F" type="integer" max="32767" units="dev"/>
-        </inkml:traceFormat>
-        <inkml:channelProperties>
-          <inkml:channelProperty channel="X" name="resolution" value="1000" units="1/cm"/>
-          <inkml:channelProperty channel="Y" name="resolution" value="1000" units="1/cm"/>
-          <inkml:channelProperty channel="F" name="resolution" value="0" units="1/dev"/>
-        </inkml:channelProperties>
-      </inkml:inkSource>
-      <inkml:timestamp xml:id="ts0" timeString="2025-11-30T05:53:50.967"/>
+      <inkml:timestamp xml:id="ts0" timeString="2026-01-06T16:30:07.518"/>
     </inkml:context>
     <inkml:brush xml:id="br0">
       <inkml:brushProperty name="width" value="0.035" units="cm"/>
       <inkml:brushProperty name="height" value="0.035" units="cm"/>
     </inkml:brush>
   </inkml:definitions>
-  <inkml:trace contextRef="#ctx0" brushRef="#br0">0 1 24575,'0'3'0,"0"5"0,4 1 0,0 3 0,4 2 0,0 2 0,-1 2 0,2-2 0,-1 0 0,1-3 0,4-4 0,-2 0 0,-2 2 0,-2 3 0,-3 2 0,-2-2-8191</inkml:trace>
-</inkml:ink>
-</file>
-
-<file path=ppt/ink/ink15.xml><?xml version="1.0" encoding="utf-8"?>
-<inkml:ink xmlns:inkml="http://www.w3.org/2003/InkML">
-  <inkml:definitions>
-    <inkml:context xml:id="ctx0">
-      <inkml:inkSource xml:id="inkSrc0">
-        <inkml:traceFormat>
-          <inkml:channel name="X" type="integer" min="-2.14748E9" max="2.14748E9" units="cm"/>
-          <inkml:channel name="Y" type="integer" min="-2.14748E9" max="2.14748E9" units="cm"/>
-          <inkml:channel name="F" type="integer" max="32767" units="dev"/>
-        </inkml:traceFormat>
-        <inkml:channelProperties>
-          <inkml:channelProperty channel="X" name="resolution" value="1000" units="1/cm"/>
-          <inkml:channelProperty channel="Y" name="resolution" value="1000" units="1/cm"/>
-          <inkml:channelProperty channel="F" name="resolution" value="0" units="1/dev"/>
-        </inkml:channelProperties>
-      </inkml:inkSource>
-      <inkml:timestamp xml:id="ts0" timeString="2025-11-30T05:53:54.819"/>
-    </inkml:context>
-    <inkml:brush xml:id="br0">
-      <inkml:brushProperty name="width" value="0.035" units="cm"/>
-      <inkml:brushProperty name="height" value="0.035" units="cm"/>
-    </inkml:brush>
-  </inkml:definitions>
-  <inkml:trace contextRef="#ctx0" brushRef="#br0">0 222 24575,'1'-4'0,"0"-1"0,1 1 0,0-1 0,0 1 0,0-1 0,0 1 0,0 0 0,1 0 0,0 0 0,0 0 0,0 1 0,0-1 0,7-4 0,15-22 0,-15 14 0,0 1 0,1 1 0,1-1 0,1 2 0,18-18 0,-27 28 0,0 0 0,0 1 0,0-1 0,0 1 0,1 0 0,-1 0 0,0 0 0,1 0 0,0 1 0,-1 0 0,7-1 0,-7 2 0,-1 0 0,1 0 0,-1 1 0,0-1 0,1 1 0,-1-1 0,0 1 0,0 0 0,0 1 0,1-1 0,-1 1 0,0-1 0,-1 1 0,1 0 0,0 0 0,0 0 0,-1 0 0,3 3 0,12 11 0,0 0 0,0-1 0,2-1 0,23 14 0,-39-26-72,0 0 1,1 0-1,-2 1 0,1 0 0,0-1 0,0 1 0,-1 0 0,1 0 1,-1 1-1,0-1 0,0 0 0,0 1 0,-1-1 0,1 1 0,-1 0 1,0-1-1,0 1 0,1 5 0,0 9-6754</inkml:trace>
-</inkml:ink>
-</file>
-
-<file path=ppt/ink/ink16.xml><?xml version="1.0" encoding="utf-8"?>
-<inkml:ink xmlns:inkml="http://www.w3.org/2003/InkML">
-  <inkml:definitions>
-    <inkml:context xml:id="ctx0">
-      <inkml:inkSource xml:id="inkSrc0">
-        <inkml:traceFormat>
-          <inkml:channel name="X" type="integer" min="-2.14748E9" max="2.14748E9" units="cm"/>
-          <inkml:channel name="Y" type="integer" min="-2.14748E9" max="2.14748E9" units="cm"/>
-          <inkml:channel name="F" type="integer" max="32767" units="dev"/>
-        </inkml:traceFormat>
-        <inkml:channelProperties>
-          <inkml:channelProperty channel="X" name="resolution" value="1000" units="1/cm"/>
-          <inkml:channelProperty channel="Y" name="resolution" value="1000" units="1/cm"/>
-          <inkml:channelProperty channel="F" name="resolution" value="0" units="1/dev"/>
-        </inkml:channelProperties>
-      </inkml:inkSource>
-      <inkml:timestamp xml:id="ts0" timeString="2025-11-30T05:54:13.911"/>
-    </inkml:context>
-    <inkml:brush xml:id="br0">
-      <inkml:brushProperty name="width" value="0.035" units="cm"/>
-      <inkml:brushProperty name="height" value="0.035" units="cm"/>
-    </inkml:brush>
-  </inkml:definitions>
-  <inkml:trace contextRef="#ctx0" brushRef="#br0">1 180 24575,'0'-3'0,"3"-2"0,2-3 0,-1-4 0,0-3 0,-2-2 0,0-2 0,2 2 0,4 5 0,1 0 0,-1-1 0,-2-2 0,-2-2 0,-2 3-8191</inkml:trace>
-</inkml:ink>
-</file>
-
-<file path=ppt/ink/ink17.xml><?xml version="1.0" encoding="utf-8"?>
-<inkml:ink xmlns:inkml="http://www.w3.org/2003/InkML">
-  <inkml:definitions>
-    <inkml:context xml:id="ctx0">
-      <inkml:inkSource xml:id="inkSrc0">
-        <inkml:traceFormat>
-          <inkml:channel name="X" type="integer" min="-2.14748E9" max="2.14748E9" units="cm"/>
-          <inkml:channel name="Y" type="integer" min="-2.14748E9" max="2.14748E9" units="cm"/>
-          <inkml:channel name="F" type="integer" max="32767" units="dev"/>
-        </inkml:traceFormat>
-        <inkml:channelProperties>
-          <inkml:channelProperty channel="X" name="resolution" value="1000" units="1/cm"/>
-          <inkml:channelProperty channel="Y" name="resolution" value="1000" units="1/cm"/>
-          <inkml:channelProperty channel="F" name="resolution" value="0" units="1/dev"/>
-        </inkml:channelProperties>
-      </inkml:inkSource>
-      <inkml:timestamp xml:id="ts0" timeString="2025-11-30T05:54:15.397"/>
-    </inkml:context>
-    <inkml:brush xml:id="br0">
-      <inkml:brushProperty name="width" value="0.035" units="cm"/>
-      <inkml:brushProperty name="height" value="0.035" units="cm"/>
-    </inkml:brush>
-  </inkml:definitions>
-  <inkml:trace contextRef="#ctx0" brushRef="#br0">1 0 24575,'3'0'0,"5"0"0,5 0 0,3 0 0,2 0 0,2 0 0,0 0 0,1 0 0,-3 3 0,-2 2 0,1-1 0,-4 0-8191</inkml:trace>
-</inkml:ink>
-</file>
-
-<file path=ppt/ink/ink18.xml><?xml version="1.0" encoding="utf-8"?>
-<inkml:ink xmlns:inkml="http://www.w3.org/2003/InkML">
-  <inkml:definitions>
-    <inkml:context xml:id="ctx0">
-      <inkml:inkSource xml:id="inkSrc0">
-        <inkml:traceFormat>
-          <inkml:channel name="X" type="integer" min="-2.14748E9" max="2.14748E9" units="cm"/>
-          <inkml:channel name="Y" type="integer" min="-2.14748E9" max="2.14748E9" units="cm"/>
-          <inkml:channel name="F" type="integer" max="32767" units="dev"/>
-        </inkml:traceFormat>
-        <inkml:channelProperties>
-          <inkml:channelProperty channel="X" name="resolution" value="1000" units="1/cm"/>
-          <inkml:channelProperty channel="Y" name="resolution" value="1000" units="1/cm"/>
-          <inkml:channelProperty channel="F" name="resolution" value="0" units="1/dev"/>
-        </inkml:channelProperties>
-      </inkml:inkSource>
-      <inkml:timestamp xml:id="ts0" timeString="2025-11-30T05:54:17.393"/>
-    </inkml:context>
-    <inkml:brush xml:id="br0">
-      <inkml:brushProperty name="width" value="0.035" units="cm"/>
-      <inkml:brushProperty name="height" value="0.035" units="cm"/>
-    </inkml:brush>
-  </inkml:definitions>
-  <inkml:trace contextRef="#ctx0" brushRef="#br0">0 131 24575,'0'-3'0,"0"-6"0,3 0 0,5 1 0,5 2 0,-1-1 0,2 0 0,-2-2 0,1 1 0,1-2 0,2 0 0,-2 0 0,0 0 0,1 3 0,2 2 0,-2-2 0,-4 1-8191</inkml:trace>
-</inkml:ink>
-</file>
-
-<file path=ppt/ink/ink19.xml><?xml version="1.0" encoding="utf-8"?>
-<inkml:ink xmlns:inkml="http://www.w3.org/2003/InkML">
-  <inkml:definitions>
-    <inkml:context xml:id="ctx0">
-      <inkml:inkSource xml:id="inkSrc0">
-        <inkml:traceFormat>
-          <inkml:channel name="X" type="integer" min="-2.14748E9" max="2.14748E9" units="cm"/>
-          <inkml:channel name="Y" type="integer" min="-2.14748E9" max="2.14748E9" units="cm"/>
-          <inkml:channel name="F" type="integer" max="32767" units="dev"/>
-        </inkml:traceFormat>
-        <inkml:channelProperties>
-          <inkml:channelProperty channel="X" name="resolution" value="1000" units="1/cm"/>
-          <inkml:channelProperty channel="Y" name="resolution" value="1000" units="1/cm"/>
-          <inkml:channelProperty channel="F" name="resolution" value="0" units="1/dev"/>
-        </inkml:channelProperties>
-      </inkml:inkSource>
-      <inkml:timestamp xml:id="ts0" timeString="2025-11-30T05:54:19.063"/>
-    </inkml:context>
-    <inkml:brush xml:id="br0">
-      <inkml:brushProperty name="width" value="0.035" units="cm"/>
-      <inkml:brushProperty name="height" value="0.035" units="cm"/>
-    </inkml:brush>
-  </inkml:definitions>
-  <inkml:trace contextRef="#ctx0" brushRef="#br0">0 62 24575,'3'0'0,"5"0"0,5 0 0,-1-7 0,2-2 0,1 0 0,2 2 0,2 3 0,0 0 0,-2-1 0,-1 0 0,0 1 0,1 1 0,1 1 0,1 1 0,0 0 0,-2 1-8191</inkml:trace>
+  <inkml:trace contextRef="#ctx0" brushRef="#br0">1 9269 24575,'572'0'0,"-474"8"0,-5 0 0,-56-7 0,5 0 0,69-6 0,-108 5 0,-1-1 0,1 1 0,-1-1 0,1 1 0,0-1 0,-1 0 0,1 0 0,-1 0 0,0 0 0,1-1 0,-1 1 0,0 0 0,0-1 0,4-3 0,-3 0 0,0 1 0,0-1 0,0 0 0,0-1 0,2-8 0,2-5 0,7-36 0,1-3 0,-11 40 0,1 0 0,2-29 0,-5 28 0,1 0 0,7-23 0,-5 22 0,0 0 0,-2 0 0,3-35 0,-6-64 0,-1 75 0,7-76 0,3 17 0,-7-159 0,-3 134 0,1 102 0,-1 9 0,1-1 0,1 0 0,0 0 0,1 1 0,7-25 0,-3 21 0,-1-1 0,-1 0 0,2-42 0,-6-69 0,-2 56 0,1 41 0,0 17 0,1 0 0,1 0 0,0 0 0,1-1 0,8-28 0,-4 25 0,-2 0 0,0 0 0,-2 0 0,0-40 0,1-13 0,0 49 0,2 0 0,9-27 0,-7 30 0,-2-1 0,5-41 0,-9 10 0,-1 40 0,0 0 0,0 0 0,2 0 0,0 1 0,7-25 0,-4 19 0,-1 1 0,0-1 0,-2 0 0,1-22 0,0-8 0,11-26 0,-9 52 0,4-39 0,-7 2 0,-2 38 0,1 0 0,1 0 0,6-34 0,-1 22 0,-1-1 0,0-68 0,-4 65 0,5-37-444,0-12-115,-5 62 828,0-1 0,10-35 0,-3 17-73,-3-16-196,-5 44 0,1-1 0,1 1 0,5-19 0,-3 16 0,5-38 0,-8 39 0,1 1 0,8-28 0,-4 23 0,-2-1 0,-1 0 0,2-44 0,0-1 0,-1-14 0,-4 59 0,0 0 0,10-49 0,-3 44 0,15-40 0,-19 55 0,0 1 0,0 0 0,-1-1 0,-1 0 0,0 0 0,-1-21 0,1-13 0,0 35 0,1 0 0,5-17 0,-3 16 0,3-25 0,12-176 0,-6 140 0,-9 51 0,5-40 0,-7 36 0,10-37 0,-7 38 0,3-41 0,-5 38 0,1 0 0,10-37 0,-7 40 0,-2 0 0,-1-1 0,1-30 0,-4 27 0,2-1 0,9-39 0,-4 8 0,-7 43 0,1 0 0,8-28 0,7-32 0,-5 16 0,-6 30 0,-1 0 0,1-42 0,1-8 0,-3 8 0,-5 59 0,0 0 0,2 0 0,0 0 0,8-31 0,-5 29 0,0 0 0,2-23 0,-5 21 0,11-35 0,-7 33 0,-2 1 0,4-42 0,-5 36 0,7-34 0,-1 15 0,3-51 0,0-6 0,14 0 0,-2-5 0,-12 56 0,2 4 0,-9 35 0,-1-1 0,0 0 0,2-26 0,10-149 0,-2 118 0,-8 49 0,5-45 0,-9 53 0,0 0 0,9-27 0,-6 25 0,4-28 0,14-70 0,-15 86 0,-1-1 0,-2 0 0,2-33 0,-7 44 0,0 4 0,0-1 0,2 1 0,0 0 0,6-24 0,-3 17 0,6-44 0,-7 36 0,0 11 0,1 0 0,0 1 0,12-26 0,-8 24 0,-2 0 0,6-27 0,5-61 0,-15 95 0,1 0 0,0 0 0,1 1 0,12-22 0,6-16 0,-19 40 0,1 1 0,0 0 0,1 0 0,0 1 0,0 0 0,1 0 0,0 0 0,1 1 0,0 0 0,0 0 0,1 1 0,-1 0 0,2 0 0,-1 1 0,1 0 0,0 1 0,0 0 0,20-6 0,138-35 0,-102 37 0,-49 7 0,1 0 0,33-9 0,-30 5 0,0 1 0,0 1 0,0 1 0,23-1 0,90 6 0,-54 0 0,-65-2 0,10 0 0,1 0 0,-1-2 0,49-9 0,-45 5 0,-1 1 0,51-3 0,57 8 0,3 0 0,-64-8-331,14 1-98,-83 6 429,20 1 0,0-1 0,-1-1 0,30-7 0,-18 2 82,0 1 1,55-2-1,77 9 323,-65 1-297,1076-2-108,-1173 0 0,0 0 0,0 0 0,0 1 0,0 0 0,10 2 0,-15-2 0,0 0 0,-1 0 0,1-1 0,0 1 0,0 1 0,0-1 0,-1 0 0,1 0 0,0 1 0,-1-1 0,0 1 0,1-1 0,-1 1 0,0 0 0,1-1 0,-1 1 0,0 0 0,-1 0 0,1 0 0,0 0 0,0 0 0,-1 0 0,1 2 0,1 8 0,-1 0 0,1 18 0,1 20 0,6 9 0,-2 0 0,0 75 0,-8 414-1365,1-525-5461</inkml:trace>
 </inkml:ink>
 </file>
 
@@ -602,46 +327,18 @@
           <inkml:channelProperty channel="F" name="resolution" value="0" units="1/dev"/>
         </inkml:channelProperties>
       </inkml:inkSource>
-      <inkml:timestamp xml:id="ts0" timeString="2025-11-30T05:20:59.272"/>
-    </inkml:context>
-    <inkml:brush xml:id="br0">
-      <inkml:brushProperty name="width" value="0.35" units="cm"/>
-      <inkml:brushProperty name="height" value="0.35" units="cm"/>
-      <inkml:brushProperty name="color" value="#FFFFFF"/>
-    </inkml:brush>
-  </inkml:definitions>
-  <inkml:trace contextRef="#ctx0" brushRef="#br0">0 998 24575,'8'-1'0,"0"0"0,0 0 0,0 0 0,0-1 0,-1 0 0,1-1 0,9-4 0,53-30 0,-26 13 0,16-6 0,114-39 0,162-49 0,-280 96 0,-23 8 0,1 1 0,0 1 0,65-11 0,-38 12 0,109-36 0,-96 25 0,-57 15 0,0 0 0,0-1 0,18-11 0,15-7 0,-10 7 0,116-48 0,-117 55 0,34-14 0,-3-3 0,135-35 0,0 0 0,-159 47 0,146-50 0,-13 10 0,-127 43 0,101-12 0,-95 17 0</inkml:trace>
-</inkml:ink>
-</file>
-
-<file path=ppt/ink/ink20.xml><?xml version="1.0" encoding="utf-8"?>
-<inkml:ink xmlns:inkml="http://www.w3.org/2003/InkML">
-  <inkml:definitions>
-    <inkml:context xml:id="ctx0">
-      <inkml:inkSource xml:id="inkSrc0">
-        <inkml:traceFormat>
-          <inkml:channel name="X" type="integer" min="-2.14748E9" max="2.14748E9" units="cm"/>
-          <inkml:channel name="Y" type="integer" min="-2.14748E9" max="2.14748E9" units="cm"/>
-          <inkml:channel name="F" type="integer" max="32767" units="dev"/>
-        </inkml:traceFormat>
-        <inkml:channelProperties>
-          <inkml:channelProperty channel="X" name="resolution" value="1000" units="1/cm"/>
-          <inkml:channelProperty channel="Y" name="resolution" value="1000" units="1/cm"/>
-          <inkml:channelProperty channel="F" name="resolution" value="0" units="1/dev"/>
-        </inkml:channelProperties>
-      </inkml:inkSource>
-      <inkml:timestamp xml:id="ts0" timeString="2025-11-30T05:54:20.674"/>
+      <inkml:timestamp xml:id="ts0" timeString="2026-01-06T16:30:20.647"/>
     </inkml:context>
     <inkml:brush xml:id="br0">
       <inkml:brushProperty name="width" value="0.035" units="cm"/>
       <inkml:brushProperty name="height" value="0.035" units="cm"/>
     </inkml:brush>
   </inkml:definitions>
-  <inkml:trace contextRef="#ctx0" brushRef="#br0">0 1 24575,'3'0'0,"6"0"0,0 3 0,2 2 0,0 3 0,0 0 0,3-1 0,-1 2 0,0-1 0,1-2 0,-1 1 0,-3 1-8191</inkml:trace>
+  <inkml:trace contextRef="#ctx0" brushRef="#br0">0 39 24575,'3'1'0,"-1"0"0,0 0 0,1 0 0,-1 0 0,0 1 0,0-1 0,0 1 0,0-1 0,0 1 0,0 0 0,2 3 0,10 7 0,-10-9 0,0 0 0,-1 1 0,1 0 0,-1-1 0,0 1 0,0 1 0,0-1 0,-1 0 0,4 9 0,-3-7 0,1 0 0,-1 0 0,1 0 0,7 8 0,-7-10 0,9 6 0,-8-12 0,-1-10 0,-1 0 0,1 0 0,0 1 0,1 0 0,1 0 0,0 0 0,0 1 0,1-1 0,9-10 0,24-19 0,-40 40 0,0 0 0,0 0 0,0 0 0,0 0 0,0 0 0,1 0 0,-1 0 0,0 0 0,0 0 0,0 0 0,0 0 0,0 0 0,0-1 0,0 1 0,0 0 0,0 0 0,0 0 0,1 0 0,-1 0 0,0 0 0,0 0 0,0-1 0,0 1 0,0 0 0,0 0 0,0 0 0,0 0 0,0 0 0,0 0 0,0 0 0,0-1 0,0 1 0,0 0 0,0 0 0,0 0 0,0 0 0,0 0 0,0 0 0,0-1 0,0 1 0,0 0 0,0 0 0,-1 0 0,1 0 0,0 0 0,0 0 0,0 0 0,0 0 0,0-1 0,0 1 0,0 0 0,0 0 0,0 0 0,-1 0 0,-8 1 0,-12 8 0,7 0 0,12-9 0,0 1 0,0 0 0,0 0 0,0 1 0,0-1 0,0 0 0,0 1 0,1-1 0,-1 1 0,1-1 0,-1 1 0,1 0 0,-1 0 0,1-1 0,0 1 0,0 0 0,0 0 0,0 1 0,0-1 0,0 0 0,0 0 0,0 5 0,1-5 0,0 1 0,0-1 0,-1 1 0,1 0 0,-1-1 0,1 1 0,-1-1 0,0 1 0,0-1 0,0 1 0,0-1 0,-1 0 0,1 0 0,-1 1 0,-3 3 0,3-5 0,0 0 0,0 1 0,0-1 0,0 0 0,0 0 0,-1 0 0,1-1 0,0 1 0,-1 0 0,1-1 0,0 1 0,-1-1 0,1 0 0,-1 0 0,1 0 0,-5-1 0,5 1 0,0 0 0,0-1 0,0 1 0,1-1 0,-1 0 0,0 1 0,1-1 0,-1 0 0,0 0 0,1 0 0,-1 0 0,1 0 0,-1-1 0,1 1 0,0 0 0,-2-2 0,-17-28 0,7 10 0,-6-7-1365</inkml:trace>
 </inkml:ink>
 </file>
 
-<file path=ppt/ink/ink21.xml><?xml version="1.0" encoding="utf-8"?>
+<file path=ppt/ink/ink3.xml><?xml version="1.0" encoding="utf-8"?>
 <inkml:ink xmlns:inkml="http://www.w3.org/2003/InkML">
   <inkml:definitions>
     <inkml:context xml:id="ctx0">
@@ -673,7 +370,7 @@
 </inkml:ink>
 </file>
 
-<file path=ppt/ink/ink22.xml><?xml version="1.0" encoding="utf-8"?>
+<file path=ppt/ink/ink4.xml><?xml version="1.0" encoding="utf-8"?>
 <inkml:ink xmlns:inkml="http://www.w3.org/2003/InkML">
   <inkml:definitions>
     <inkml:context xml:id="ctx0">
@@ -700,7 +397,7 @@
 </inkml:ink>
 </file>
 
-<file path=ppt/ink/ink23.xml><?xml version="1.0" encoding="utf-8"?>
+<file path=ppt/ink/ink5.xml><?xml version="1.0" encoding="utf-8"?>
 <inkml:ink xmlns:inkml="http://www.w3.org/2003/InkML">
   <inkml:definitions>
     <inkml:context xml:id="ctx0">
@@ -727,7 +424,7 @@
 </inkml:ink>
 </file>
 
-<file path=ppt/ink/ink24.xml><?xml version="1.0" encoding="utf-8"?>
+<file path=ppt/ink/ink6.xml><?xml version="1.0" encoding="utf-8"?>
 <inkml:ink xmlns:inkml="http://www.w3.org/2003/InkML">
   <inkml:definitions>
     <inkml:context xml:id="ctx0">
@@ -754,7 +451,7 @@
 </inkml:ink>
 </file>
 
-<file path=ppt/ink/ink25.xml><?xml version="1.0" encoding="utf-8"?>
+<file path=ppt/ink/ink7.xml><?xml version="1.0" encoding="utf-8"?>
 <inkml:ink xmlns:inkml="http://www.w3.org/2003/InkML">
   <inkml:definitions>
     <inkml:context xml:id="ctx0">
@@ -778,202 +475,6 @@
     </inkml:brush>
   </inkml:definitions>
   <inkml:trace contextRef="#ctx0" brushRef="#br0">1 1 24575</inkml:trace>
-</inkml:ink>
-</file>
-
-<file path=ppt/ink/ink3.xml><?xml version="1.0" encoding="utf-8"?>
-<inkml:ink xmlns:inkml="http://www.w3.org/2003/InkML">
-  <inkml:definitions>
-    <inkml:context xml:id="ctx0">
-      <inkml:inkSource xml:id="inkSrc0">
-        <inkml:traceFormat>
-          <inkml:channel name="X" type="integer" min="-2.14748E9" max="2.14748E9" units="cm"/>
-          <inkml:channel name="Y" type="integer" min="-2.14748E9" max="2.14748E9" units="cm"/>
-          <inkml:channel name="F" type="integer" max="32767" units="dev"/>
-        </inkml:traceFormat>
-        <inkml:channelProperties>
-          <inkml:channelProperty channel="X" name="resolution" value="1000" units="1/cm"/>
-          <inkml:channelProperty channel="Y" name="resolution" value="1000" units="1/cm"/>
-          <inkml:channelProperty channel="F" name="resolution" value="0" units="1/dev"/>
-        </inkml:channelProperties>
-      </inkml:inkSource>
-      <inkml:timestamp xml:id="ts0" timeString="2025-11-30T05:21:09.960"/>
-    </inkml:context>
-    <inkml:brush xml:id="br0">
-      <inkml:brushProperty name="width" value="0.35" units="cm"/>
-      <inkml:brushProperty name="height" value="0.35" units="cm"/>
-      <inkml:brushProperty name="color" value="#FFFFFF"/>
-    </inkml:brush>
-  </inkml:definitions>
-  <inkml:trace contextRef="#ctx0" brushRef="#br0">1 363 24570,'6511'-363'0</inkml:trace>
-</inkml:ink>
-</file>
-
-<file path=ppt/ink/ink4.xml><?xml version="1.0" encoding="utf-8"?>
-<inkml:ink xmlns:inkml="http://www.w3.org/2003/InkML">
-  <inkml:definitions>
-    <inkml:context xml:id="ctx0">
-      <inkml:inkSource xml:id="inkSrc0">
-        <inkml:traceFormat>
-          <inkml:channel name="X" type="integer" min="-2.14748E9" max="2.14748E9" units="cm"/>
-          <inkml:channel name="Y" type="integer" min="-2.14748E9" max="2.14748E9" units="cm"/>
-          <inkml:channel name="F" type="integer" max="32767" units="dev"/>
-        </inkml:traceFormat>
-        <inkml:channelProperties>
-          <inkml:channelProperty channel="X" name="resolution" value="1000" units="1/cm"/>
-          <inkml:channelProperty channel="Y" name="resolution" value="1000" units="1/cm"/>
-          <inkml:channelProperty channel="F" name="resolution" value="0" units="1/dev"/>
-        </inkml:channelProperties>
-      </inkml:inkSource>
-      <inkml:timestamp xml:id="ts0" timeString="2025-11-30T05:21:13.523"/>
-    </inkml:context>
-    <inkml:brush xml:id="br0">
-      <inkml:brushProperty name="width" value="0.35" units="cm"/>
-      <inkml:brushProperty name="height" value="0.35" units="cm"/>
-      <inkml:brushProperty name="color" value="#FFFFFF"/>
-    </inkml:brush>
-  </inkml:definitions>
-  <inkml:trace contextRef="#ctx0" brushRef="#br0">0 41 24575,'958'0'0,"-943"-1"0,-1 0 0,0-1 0,1-1 0,-1-1 0,14-5 0,-13 4 0,1 0 0,0 2 0,30-4 0,150 6 0,-89 3 0,21 8 0,-10 0 0,20-12 0,78 4 0,-181 5-1365</inkml:trace>
-</inkml:ink>
-</file>
-
-<file path=ppt/ink/ink5.xml><?xml version="1.0" encoding="utf-8"?>
-<inkml:ink xmlns:inkml="http://www.w3.org/2003/InkML">
-  <inkml:definitions>
-    <inkml:context xml:id="ctx0">
-      <inkml:inkSource xml:id="inkSrc0">
-        <inkml:traceFormat>
-          <inkml:channel name="X" type="integer" min="-2.14748E9" max="2.14748E9" units="cm"/>
-          <inkml:channel name="Y" type="integer" min="-2.14748E9" max="2.14748E9" units="cm"/>
-          <inkml:channel name="F" type="integer" max="32767" units="dev"/>
-        </inkml:traceFormat>
-        <inkml:channelProperties>
-          <inkml:channelProperty channel="X" name="resolution" value="1000" units="1/cm"/>
-          <inkml:channelProperty channel="Y" name="resolution" value="1000" units="1/cm"/>
-          <inkml:channelProperty channel="F" name="resolution" value="0" units="1/dev"/>
-        </inkml:channelProperties>
-      </inkml:inkSource>
-      <inkml:timestamp xml:id="ts0" timeString="2025-11-30T05:20:52.965"/>
-    </inkml:context>
-    <inkml:brush xml:id="br0">
-      <inkml:brushProperty name="width" value="0.35" units="cm"/>
-      <inkml:brushProperty name="height" value="0.35" units="cm"/>
-      <inkml:brushProperty name="color" value="#FFFFFF"/>
-    </inkml:brush>
-  </inkml:definitions>
-  <inkml:trace contextRef="#ctx0" brushRef="#br0">0 0 24575,'0'0'-8191</inkml:trace>
-</inkml:ink>
-</file>
-
-<file path=ppt/ink/ink6.xml><?xml version="1.0" encoding="utf-8"?>
-<inkml:ink xmlns:inkml="http://www.w3.org/2003/InkML">
-  <inkml:definitions>
-    <inkml:context xml:id="ctx0">
-      <inkml:inkSource xml:id="inkSrc0">
-        <inkml:traceFormat>
-          <inkml:channel name="X" type="integer" min="-2.14748E9" max="2.14748E9" units="cm"/>
-          <inkml:channel name="Y" type="integer" min="-2.14748E9" max="2.14748E9" units="cm"/>
-          <inkml:channel name="F" type="integer" max="32767" units="dev"/>
-        </inkml:traceFormat>
-        <inkml:channelProperties>
-          <inkml:channelProperty channel="X" name="resolution" value="1000" units="1/cm"/>
-          <inkml:channelProperty channel="Y" name="resolution" value="1000" units="1/cm"/>
-          <inkml:channelProperty channel="F" name="resolution" value="0" units="1/dev"/>
-        </inkml:channelProperties>
-      </inkml:inkSource>
-      <inkml:timestamp xml:id="ts0" timeString="2025-11-30T05:20:53.539"/>
-    </inkml:context>
-    <inkml:brush xml:id="br0">
-      <inkml:brushProperty name="width" value="0.35" units="cm"/>
-      <inkml:brushProperty name="height" value="0.35" units="cm"/>
-      <inkml:brushProperty name="color" value="#FFFFFF"/>
-    </inkml:brush>
-  </inkml:definitions>
-  <inkml:trace contextRef="#ctx0" brushRef="#br0">0 0 24575</inkml:trace>
-</inkml:ink>
-</file>
-
-<file path=ppt/ink/ink7.xml><?xml version="1.0" encoding="utf-8"?>
-<inkml:ink xmlns:inkml="http://www.w3.org/2003/InkML">
-  <inkml:definitions>
-    <inkml:context xml:id="ctx0">
-      <inkml:inkSource xml:id="inkSrc0">
-        <inkml:traceFormat>
-          <inkml:channel name="X" type="integer" min="-2.14748E9" max="2.14748E9" units="cm"/>
-          <inkml:channel name="Y" type="integer" min="-2.14748E9" max="2.14748E9" units="cm"/>
-          <inkml:channel name="F" type="integer" max="32767" units="dev"/>
-        </inkml:traceFormat>
-        <inkml:channelProperties>
-          <inkml:channelProperty channel="X" name="resolution" value="1000" units="1/cm"/>
-          <inkml:channelProperty channel="Y" name="resolution" value="1000" units="1/cm"/>
-          <inkml:channelProperty channel="F" name="resolution" value="0" units="1/dev"/>
-        </inkml:channelProperties>
-      </inkml:inkSource>
-      <inkml:timestamp xml:id="ts0" timeString="2025-11-30T05:20:54.187"/>
-    </inkml:context>
-    <inkml:brush xml:id="br0">
-      <inkml:brushProperty name="width" value="0.35" units="cm"/>
-      <inkml:brushProperty name="height" value="0.35" units="cm"/>
-      <inkml:brushProperty name="color" value="#FFFFFF"/>
-    </inkml:brush>
-  </inkml:definitions>
-  <inkml:trace contextRef="#ctx0" brushRef="#br0">0 0 24575</inkml:trace>
-</inkml:ink>
-</file>
-
-<file path=ppt/ink/ink8.xml><?xml version="1.0" encoding="utf-8"?>
-<inkml:ink xmlns:inkml="http://www.w3.org/2003/InkML">
-  <inkml:definitions>
-    <inkml:context xml:id="ctx0">
-      <inkml:inkSource xml:id="inkSrc0">
-        <inkml:traceFormat>
-          <inkml:channel name="X" type="integer" min="-2.14748E9" max="2.14748E9" units="cm"/>
-          <inkml:channel name="Y" type="integer" min="-2.14748E9" max="2.14748E9" units="cm"/>
-          <inkml:channel name="F" type="integer" max="32767" units="dev"/>
-        </inkml:traceFormat>
-        <inkml:channelProperties>
-          <inkml:channelProperty channel="X" name="resolution" value="1000" units="1/cm"/>
-          <inkml:channelProperty channel="Y" name="resolution" value="1000" units="1/cm"/>
-          <inkml:channelProperty channel="F" name="resolution" value="0" units="1/dev"/>
-        </inkml:channelProperties>
-      </inkml:inkSource>
-      <inkml:timestamp xml:id="ts0" timeString="2025-11-30T05:20:54.727"/>
-    </inkml:context>
-    <inkml:brush xml:id="br0">
-      <inkml:brushProperty name="width" value="0.35" units="cm"/>
-      <inkml:brushProperty name="height" value="0.35" units="cm"/>
-      <inkml:brushProperty name="color" value="#FFFFFF"/>
-    </inkml:brush>
-  </inkml:definitions>
-  <inkml:trace contextRef="#ctx0" brushRef="#br0">0 0 24575,'0'0'-8191</inkml:trace>
-</inkml:ink>
-</file>
-
-<file path=ppt/ink/ink9.xml><?xml version="1.0" encoding="utf-8"?>
-<inkml:ink xmlns:inkml="http://www.w3.org/2003/InkML">
-  <inkml:definitions>
-    <inkml:context xml:id="ctx0">
-      <inkml:inkSource xml:id="inkSrc0">
-        <inkml:traceFormat>
-          <inkml:channel name="X" type="integer" min="-2.14748E9" max="2.14748E9" units="cm"/>
-          <inkml:channel name="Y" type="integer" min="-2.14748E9" max="2.14748E9" units="cm"/>
-          <inkml:channel name="F" type="integer" max="32767" units="dev"/>
-        </inkml:traceFormat>
-        <inkml:channelProperties>
-          <inkml:channelProperty channel="X" name="resolution" value="1000" units="1/cm"/>
-          <inkml:channelProperty channel="Y" name="resolution" value="1000" units="1/cm"/>
-          <inkml:channelProperty channel="F" name="resolution" value="0" units="1/dev"/>
-        </inkml:channelProperties>
-      </inkml:inkSource>
-      <inkml:timestamp xml:id="ts0" timeString="2025-11-30T05:20:55.192"/>
-    </inkml:context>
-    <inkml:brush xml:id="br0">
-      <inkml:brushProperty name="width" value="0.35" units="cm"/>
-      <inkml:brushProperty name="height" value="0.35" units="cm"/>
-      <inkml:brushProperty name="color" value="#FFFFFF"/>
-    </inkml:brush>
-  </inkml:definitions>
-  <inkml:trace contextRef="#ctx0" brushRef="#br0">0 0 24575</inkml:trace>
 </inkml:ink>
 </file>
 
@@ -9582,6 +9083,22 @@
             </a:pPr>
             <a:r>
               <a:rPr lang="en-US" dirty="0"/>
+              <a:t>Successful Room Creation and View</a:t>
+            </a:r>
+          </a:p>
+          <a:p>
+            <a:pPr marL="457200" lvl="0" indent="-342900" algn="l" rtl="0">
+              <a:spcBef>
+                <a:spcPts val="0"/>
+              </a:spcBef>
+              <a:spcAft>
+                <a:spcPts val="0"/>
+              </a:spcAft>
+              <a:buSzPts val="1800"/>
+              <a:buChar char="●"/>
+            </a:pPr>
+            <a:r>
+              <a:rPr lang="en-US" dirty="0"/>
               <a:t>Successful submission</a:t>
             </a:r>
           </a:p>
@@ -9903,11 +9420,11 @@
             <a:avLst/>
           </a:prstGeom>
           <a:solidFill>
-            <a:schemeClr val="accent6"/>
+            <a:srgbClr val="00B050"/>
           </a:solidFill>
           <a:ln>
             <a:solidFill>
-              <a:schemeClr val="accent6"/>
+              <a:srgbClr val="00B050"/>
             </a:solidFill>
           </a:ln>
         </p:spPr>
@@ -11202,6 +10719,222 @@
               <a:rPr lang="en-US" sz="1100" dirty="0"/>
               <a:t>To-do</a:t>
             </a:r>
+          </a:p>
+        </p:txBody>
+      </p:sp>
+      <p:sp>
+        <p:nvSpPr>
+          <p:cNvPr id="4" name="Rectangle 3">
+            <a:extLst>
+              <a:ext uri="{FF2B5EF4-FFF2-40B4-BE49-F238E27FC236}">
+                <a16:creationId xmlns:a16="http://schemas.microsoft.com/office/drawing/2014/main" id="{93C6E137-57F1-8264-B8A8-940A8A016872}"/>
+              </a:ext>
+            </a:extLst>
+          </p:cNvPr>
+          <p:cNvSpPr/>
+          <p:nvPr/>
+        </p:nvSpPr>
+        <p:spPr>
+          <a:xfrm>
+            <a:off x="4386581" y="2814956"/>
+            <a:ext cx="330562" cy="45719"/>
+          </a:xfrm>
+          <a:prstGeom prst="rect">
+            <a:avLst/>
+          </a:prstGeom>
+          <a:solidFill>
+            <a:srgbClr val="00B050"/>
+          </a:solidFill>
+          <a:ln>
+            <a:solidFill>
+              <a:srgbClr val="00B050"/>
+            </a:solidFill>
+          </a:ln>
+        </p:spPr>
+        <p:style>
+          <a:lnRef idx="2">
+            <a:schemeClr val="dk1">
+              <a:shade val="15000"/>
+            </a:schemeClr>
+          </a:lnRef>
+          <a:fillRef idx="1">
+            <a:schemeClr val="dk1"/>
+          </a:fillRef>
+          <a:effectRef idx="0">
+            <a:schemeClr val="dk1"/>
+          </a:effectRef>
+          <a:fontRef idx="minor">
+            <a:schemeClr val="lt1"/>
+          </a:fontRef>
+        </p:style>
+        <p:txBody>
+          <a:bodyPr rtlCol="0" anchor="ctr"/>
+          <a:lstStyle/>
+          <a:p>
+            <a:pPr algn="ctr"/>
+            <a:endParaRPr lang="en-US" dirty="0"/>
+          </a:p>
+        </p:txBody>
+      </p:sp>
+      <p:sp>
+        <p:nvSpPr>
+          <p:cNvPr id="18" name="Rectangle 17">
+            <a:extLst>
+              <a:ext uri="{FF2B5EF4-FFF2-40B4-BE49-F238E27FC236}">
+                <a16:creationId xmlns:a16="http://schemas.microsoft.com/office/drawing/2014/main" id="{4AE0120F-2B95-1D12-A53D-92B341AE69AC}"/>
+              </a:ext>
+            </a:extLst>
+          </p:cNvPr>
+          <p:cNvSpPr/>
+          <p:nvPr/>
+        </p:nvSpPr>
+        <p:spPr>
+          <a:xfrm>
+            <a:off x="4640720" y="2719071"/>
+            <a:ext cx="279400" cy="61503"/>
+          </a:xfrm>
+          <a:prstGeom prst="rect">
+            <a:avLst/>
+          </a:prstGeom>
+          <a:solidFill>
+            <a:srgbClr val="00B050"/>
+          </a:solidFill>
+          <a:ln>
+            <a:solidFill>
+              <a:srgbClr val="00B050"/>
+            </a:solidFill>
+          </a:ln>
+        </p:spPr>
+        <p:style>
+          <a:lnRef idx="2">
+            <a:schemeClr val="dk1">
+              <a:shade val="15000"/>
+            </a:schemeClr>
+          </a:lnRef>
+          <a:fillRef idx="1">
+            <a:schemeClr val="dk1"/>
+          </a:fillRef>
+          <a:effectRef idx="0">
+            <a:schemeClr val="dk1"/>
+          </a:effectRef>
+          <a:fontRef idx="minor">
+            <a:schemeClr val="lt1"/>
+          </a:fontRef>
+        </p:style>
+        <p:txBody>
+          <a:bodyPr rtlCol="0" anchor="ctr"/>
+          <a:lstStyle/>
+          <a:p>
+            <a:pPr algn="ctr"/>
+            <a:endParaRPr lang="en-US" dirty="0"/>
+          </a:p>
+        </p:txBody>
+      </p:sp>
+      <p:sp>
+        <p:nvSpPr>
+          <p:cNvPr id="32" name="Rectangle 31">
+            <a:extLst>
+              <a:ext uri="{FF2B5EF4-FFF2-40B4-BE49-F238E27FC236}">
+                <a16:creationId xmlns:a16="http://schemas.microsoft.com/office/drawing/2014/main" id="{23C3B5CE-571B-2556-43A4-A70D731853F5}"/>
+              </a:ext>
+            </a:extLst>
+          </p:cNvPr>
+          <p:cNvSpPr/>
+          <p:nvPr/>
+        </p:nvSpPr>
+        <p:spPr>
+          <a:xfrm>
+            <a:off x="4833256" y="2635796"/>
+            <a:ext cx="375557" cy="45719"/>
+          </a:xfrm>
+          <a:prstGeom prst="rect">
+            <a:avLst/>
+          </a:prstGeom>
+          <a:solidFill>
+            <a:schemeClr val="accent6"/>
+          </a:solidFill>
+          <a:ln>
+            <a:solidFill>
+              <a:schemeClr val="accent6"/>
+            </a:solidFill>
+          </a:ln>
+        </p:spPr>
+        <p:style>
+          <a:lnRef idx="2">
+            <a:schemeClr val="dk1">
+              <a:shade val="15000"/>
+            </a:schemeClr>
+          </a:lnRef>
+          <a:fillRef idx="1">
+            <a:schemeClr val="dk1"/>
+          </a:fillRef>
+          <a:effectRef idx="0">
+            <a:schemeClr val="dk1"/>
+          </a:effectRef>
+          <a:fontRef idx="minor">
+            <a:schemeClr val="lt1"/>
+          </a:fontRef>
+        </p:style>
+        <p:txBody>
+          <a:bodyPr rtlCol="0" anchor="ctr"/>
+          <a:lstStyle/>
+          <a:p>
+            <a:pPr algn="ctr"/>
+            <a:endParaRPr lang="en-US" dirty="0"/>
+          </a:p>
+        </p:txBody>
+      </p:sp>
+      <p:sp>
+        <p:nvSpPr>
+          <p:cNvPr id="35" name="Rectangle 34">
+            <a:extLst>
+              <a:ext uri="{FF2B5EF4-FFF2-40B4-BE49-F238E27FC236}">
+                <a16:creationId xmlns:a16="http://schemas.microsoft.com/office/drawing/2014/main" id="{77A0DDB6-4004-91B0-2475-26E021EFC26F}"/>
+              </a:ext>
+            </a:extLst>
+          </p:cNvPr>
+          <p:cNvSpPr/>
+          <p:nvPr/>
+        </p:nvSpPr>
+        <p:spPr>
+          <a:xfrm>
+            <a:off x="5143377" y="2533292"/>
+            <a:ext cx="375557" cy="63162"/>
+          </a:xfrm>
+          <a:prstGeom prst="rect">
+            <a:avLst/>
+          </a:prstGeom>
+          <a:solidFill>
+            <a:schemeClr val="accent6"/>
+          </a:solidFill>
+          <a:ln>
+            <a:solidFill>
+              <a:schemeClr val="accent6"/>
+            </a:solidFill>
+          </a:ln>
+        </p:spPr>
+        <p:style>
+          <a:lnRef idx="2">
+            <a:schemeClr val="dk1">
+              <a:shade val="15000"/>
+            </a:schemeClr>
+          </a:lnRef>
+          <a:fillRef idx="1">
+            <a:schemeClr val="dk1"/>
+          </a:fillRef>
+          <a:effectRef idx="0">
+            <a:schemeClr val="dk1"/>
+          </a:effectRef>
+          <a:fontRef idx="minor">
+            <a:schemeClr val="lt1"/>
+          </a:fontRef>
+        </p:style>
+        <p:txBody>
+          <a:bodyPr rtlCol="0" anchor="ctr"/>
+          <a:lstStyle/>
+          <a:p>
+            <a:pPr algn="ctr"/>
+            <a:endParaRPr lang="en-US" dirty="0"/>
           </a:p>
         </p:txBody>
       </p:sp>
@@ -12483,13 +12216,13 @@
           <a:p>
             <a:r>
               <a:rPr lang="en-US" dirty="0"/>
-              <a:t>Web-based platform for submitting and viewing anonymous feedback</a:t>
+              <a:t>Database storage for feedback entries</a:t>
             </a:r>
           </a:p>
           <a:p>
             <a:r>
               <a:rPr lang="en-US" dirty="0"/>
-              <a:t>Database storage for feedback entries</a:t>
+              <a:t>Creation of rooms for feedback submission and viewing</a:t>
             </a:r>
           </a:p>
           <a:p>
@@ -12589,125 +12322,6 @@
       </p:grpSpPr>
       <p:sp>
         <p:nvSpPr>
-          <p:cNvPr id="11" name="Rectangle 10">
-            <a:extLst>
-              <a:ext uri="{FF2B5EF4-FFF2-40B4-BE49-F238E27FC236}">
-                <a16:creationId xmlns:a16="http://schemas.microsoft.com/office/drawing/2014/main" id="{327B4F48-967A-3181-1846-CC8A8F066E4E}"/>
-              </a:ext>
-            </a:extLst>
-          </p:cNvPr>
-          <p:cNvSpPr/>
-          <p:nvPr/>
-        </p:nvSpPr>
-        <p:spPr>
-          <a:xfrm>
-            <a:off x="-79829" y="-21771"/>
-            <a:ext cx="3810000" cy="5312228"/>
-          </a:xfrm>
-          <a:prstGeom prst="rect">
-            <a:avLst/>
-          </a:prstGeom>
-          <a:solidFill>
-            <a:srgbClr val="D5E8D4"/>
-          </a:solidFill>
-          <a:ln>
-            <a:solidFill>
-              <a:srgbClr val="D5E8D4"/>
-            </a:solidFill>
-          </a:ln>
-        </p:spPr>
-        <p:style>
-          <a:lnRef idx="2">
-            <a:schemeClr val="accent1">
-              <a:shade val="15000"/>
-            </a:schemeClr>
-          </a:lnRef>
-          <a:fillRef idx="1">
-            <a:schemeClr val="accent1"/>
-          </a:fillRef>
-          <a:effectRef idx="0">
-            <a:schemeClr val="accent1"/>
-          </a:effectRef>
-          <a:fontRef idx="minor">
-            <a:schemeClr val="lt1"/>
-          </a:fontRef>
-        </p:style>
-        <p:txBody>
-          <a:bodyPr rtlCol="0" anchor="ctr"/>
-          <a:lstStyle/>
-          <a:p>
-            <a:pPr algn="ctr"/>
-            <a:endParaRPr lang="en-US"/>
-          </a:p>
-        </p:txBody>
-      </p:sp>
-      <p:pic>
-        <p:nvPicPr>
-          <p:cNvPr id="7" name="Picture 6">
-            <a:extLst>
-              <a:ext uri="{FF2B5EF4-FFF2-40B4-BE49-F238E27FC236}">
-                <a16:creationId xmlns:a16="http://schemas.microsoft.com/office/drawing/2014/main" id="{E276F0B3-E3FE-F044-AEAD-C0F46C4921D9}"/>
-              </a:ext>
-            </a:extLst>
-          </p:cNvPr>
-          <p:cNvPicPr>
-            <a:picLocks noChangeAspect="1"/>
-          </p:cNvPicPr>
-          <p:nvPr/>
-        </p:nvPicPr>
-        <p:blipFill>
-          <a:blip r:embed="rId3"/>
-          <a:stretch>
-            <a:fillRect/>
-          </a:stretch>
-        </p:blipFill>
-        <p:spPr>
-          <a:xfrm>
-            <a:off x="3700666" y="-21771"/>
-            <a:ext cx="3324724" cy="5179785"/>
-          </a:xfrm>
-          <a:prstGeom prst="rect">
-            <a:avLst/>
-          </a:prstGeom>
-        </p:spPr>
-      </p:pic>
-      <p:sp>
-        <p:nvSpPr>
-          <p:cNvPr id="9" name="TextBox 8">
-            <a:extLst>
-              <a:ext uri="{FF2B5EF4-FFF2-40B4-BE49-F238E27FC236}">
-                <a16:creationId xmlns:a16="http://schemas.microsoft.com/office/drawing/2014/main" id="{72D8A83F-F8F1-0C18-8FB2-BF5131D82638}"/>
-              </a:ext>
-            </a:extLst>
-          </p:cNvPr>
-          <p:cNvSpPr txBox="1"/>
-          <p:nvPr/>
-        </p:nvSpPr>
-        <p:spPr>
-          <a:xfrm>
-            <a:off x="4165600" y="1494971"/>
-            <a:ext cx="1255486" cy="169277"/>
-          </a:xfrm>
-          <a:prstGeom prst="rect">
-            <a:avLst/>
-          </a:prstGeom>
-          <a:noFill/>
-        </p:spPr>
-        <p:txBody>
-          <a:bodyPr wrap="square" rtlCol="0">
-            <a:spAutoFit/>
-          </a:bodyPr>
-          <a:lstStyle/>
-          <a:p>
-            <a:r>
-              <a:rPr lang="en-US" sz="500" dirty="0"/>
-              <a:t>Register user, redirect to login page</a:t>
-            </a:r>
-          </a:p>
-        </p:txBody>
-      </p:sp>
-      <p:sp>
-        <p:nvSpPr>
           <p:cNvPr id="8" name="Slide Number Placeholder 7">
             <a:extLst>
               <a:ext uri="{FF2B5EF4-FFF2-40B4-BE49-F238E27FC236}">
@@ -12786,60 +12400,190 @@
           </a:p>
         </p:txBody>
       </p:sp>
-      <p:sp>
-        <p:nvSpPr>
-          <p:cNvPr id="12" name="Rectangle 11">
+      <p:pic>
+        <p:nvPicPr>
+          <p:cNvPr id="2" name="Picture 1">
             <a:extLst>
               <a:ext uri="{FF2B5EF4-FFF2-40B4-BE49-F238E27FC236}">
-                <a16:creationId xmlns:a16="http://schemas.microsoft.com/office/drawing/2014/main" id="{BFB52B31-B5CF-9300-8E64-05729B4DF2BE}"/>
+                <a16:creationId xmlns:a16="http://schemas.microsoft.com/office/drawing/2014/main" id="{52A7BE73-6DDF-CF7A-4D51-E598F7F15060}"/>
               </a:ext>
             </a:extLst>
           </p:cNvPr>
-          <p:cNvSpPr/>
+          <p:cNvPicPr>
+            <a:picLocks noChangeAspect="1"/>
+          </p:cNvPicPr>
           <p:nvPr/>
-        </p:nvSpPr>
-        <p:spPr>
+        </p:nvPicPr>
+        <p:blipFill>
+          <a:blip r:embed="rId3">
+            <a:extLst>
+              <a:ext uri="{28A0092B-C50C-407E-A947-70E740481C1C}">
+                <a14:useLocalDpi xmlns:a14="http://schemas.microsoft.com/office/drawing/2010/main" val="0"/>
+              </a:ext>
+            </a:extLst>
+          </a:blip>
+          <a:srcRect b="35322"/>
+          <a:stretch>
+            <a:fillRect/>
+          </a:stretch>
+        </p:blipFill>
+        <p:spPr bwMode="auto">
           <a:xfrm>
-            <a:off x="6916056" y="-154214"/>
-            <a:ext cx="3810000" cy="5312228"/>
+            <a:off x="66397" y="504197"/>
+            <a:ext cx="2473602" cy="4639303"/>
           </a:xfrm>
           <a:prstGeom prst="rect">
             <a:avLst/>
           </a:prstGeom>
-          <a:solidFill>
-            <a:srgbClr val="D5E8D4"/>
-          </a:solidFill>
+          <a:noFill/>
           <a:ln>
-            <a:solidFill>
-              <a:srgbClr val="D5E8D4"/>
-            </a:solidFill>
+            <a:noFill/>
           </a:ln>
         </p:spPr>
-        <p:style>
-          <a:lnRef idx="2">
-            <a:schemeClr val="accent1">
-              <a:shade val="15000"/>
-            </a:schemeClr>
-          </a:lnRef>
-          <a:fillRef idx="1">
-            <a:schemeClr val="accent1"/>
-          </a:fillRef>
-          <a:effectRef idx="0">
-            <a:schemeClr val="accent1"/>
-          </a:effectRef>
-          <a:fontRef idx="minor">
-            <a:schemeClr val="lt1"/>
-          </a:fontRef>
-        </p:style>
-        <p:txBody>
-          <a:bodyPr rtlCol="0" anchor="ctr"/>
-          <a:lstStyle/>
-          <a:p>
-            <a:pPr algn="ctr"/>
-            <a:endParaRPr lang="en-US"/>
-          </a:p>
-        </p:txBody>
-      </p:sp>
+      </p:pic>
+      <p:pic>
+        <p:nvPicPr>
+          <p:cNvPr id="3" name="Picture 2">
+            <a:extLst>
+              <a:ext uri="{FF2B5EF4-FFF2-40B4-BE49-F238E27FC236}">
+                <a16:creationId xmlns:a16="http://schemas.microsoft.com/office/drawing/2014/main" id="{42C94B20-2B51-88CC-12FB-2C6315C5DC2C}"/>
+              </a:ext>
+            </a:extLst>
+          </p:cNvPr>
+          <p:cNvPicPr>
+            <a:picLocks noChangeAspect="1"/>
+          </p:cNvPicPr>
+          <p:nvPr/>
+        </p:nvPicPr>
+        <p:blipFill>
+          <a:blip r:embed="rId3">
+            <a:extLst>
+              <a:ext uri="{28A0092B-C50C-407E-A947-70E740481C1C}">
+                <a14:useLocalDpi xmlns:a14="http://schemas.microsoft.com/office/drawing/2010/main" val="0"/>
+              </a:ext>
+            </a:extLst>
+          </a:blip>
+          <a:srcRect t="63954"/>
+          <a:stretch>
+            <a:fillRect/>
+          </a:stretch>
+        </p:blipFill>
+        <p:spPr bwMode="auto">
+          <a:xfrm>
+            <a:off x="2688983" y="1961233"/>
+            <a:ext cx="2410912" cy="2633344"/>
+          </a:xfrm>
+          <a:prstGeom prst="rect">
+            <a:avLst/>
+          </a:prstGeom>
+          <a:noFill/>
+          <a:ln>
+            <a:noFill/>
+          </a:ln>
+        </p:spPr>
+      </p:pic>
+      <mc:AlternateContent xmlns:mc="http://schemas.openxmlformats.org/markup-compatibility/2006">
+        <mc:Choice xmlns:p14="http://schemas.microsoft.com/office/powerpoint/2010/main" Requires="p14">
+          <p:contentPart p14:bwMode="auto" r:id="rId4">
+            <p14:nvContentPartPr>
+              <p14:cNvPr id="4" name="Ink 3">
+                <a:extLst>
+                  <a:ext uri="{FF2B5EF4-FFF2-40B4-BE49-F238E27FC236}">
+                    <a16:creationId xmlns:a16="http://schemas.microsoft.com/office/drawing/2014/main" id="{D60F91E0-324E-C97F-AEE1-1C2203C15592}"/>
+                  </a:ext>
+                </a:extLst>
+              </p14:cNvPr>
+              <p14:cNvContentPartPr/>
+              <p14:nvPr/>
+            </p14:nvContentPartPr>
+            <p14:xfrm>
+              <a:off x="1788889" y="1647280"/>
+              <a:ext cx="2055240" cy="3343680"/>
+            </p14:xfrm>
+          </p:contentPart>
+        </mc:Choice>
+        <mc:Fallback>
+          <p:pic>
+            <p:nvPicPr>
+              <p:cNvPr id="4" name="Ink 3">
+                <a:extLst>
+                  <a:ext uri="{FF2B5EF4-FFF2-40B4-BE49-F238E27FC236}">
+                    <a16:creationId xmlns:a16="http://schemas.microsoft.com/office/drawing/2014/main" id="{D60F91E0-324E-C97F-AEE1-1C2203C15592}"/>
+                  </a:ext>
+                </a:extLst>
+              </p:cNvPr>
+              <p:cNvPicPr/>
+              <p:nvPr/>
+            </p:nvPicPr>
+            <p:blipFill>
+              <a:blip r:embed="rId5"/>
+              <a:stretch>
+                <a:fillRect/>
+              </a:stretch>
+            </p:blipFill>
+            <p:spPr>
+              <a:xfrm>
+                <a:off x="1782769" y="1641160"/>
+                <a:ext cx="2067480" cy="3355920"/>
+              </a:xfrm>
+              <a:prstGeom prst="rect">
+                <a:avLst/>
+              </a:prstGeom>
+            </p:spPr>
+          </p:pic>
+        </mc:Fallback>
+      </mc:AlternateContent>
+      <mc:AlternateContent xmlns:mc="http://schemas.openxmlformats.org/markup-compatibility/2006">
+        <mc:Choice xmlns:p14="http://schemas.microsoft.com/office/powerpoint/2010/main" Requires="p14">
+          <p:contentPart p14:bwMode="auto" r:id="rId6">
+            <p14:nvContentPartPr>
+              <p14:cNvPr id="15" name="Ink 14">
+                <a:extLst>
+                  <a:ext uri="{FF2B5EF4-FFF2-40B4-BE49-F238E27FC236}">
+                    <a16:creationId xmlns:a16="http://schemas.microsoft.com/office/drawing/2014/main" id="{78CB79C2-C064-DF2B-126B-132F30571D52}"/>
+                  </a:ext>
+                </a:extLst>
+              </p14:cNvPr>
+              <p14:cNvContentPartPr/>
+              <p14:nvPr/>
+            </p14:nvContentPartPr>
+            <p14:xfrm>
+              <a:off x="3808596" y="1946721"/>
+              <a:ext cx="82080" cy="61200"/>
+            </p14:xfrm>
+          </p:contentPart>
+        </mc:Choice>
+        <mc:Fallback>
+          <p:pic>
+            <p:nvPicPr>
+              <p:cNvPr id="15" name="Ink 14">
+                <a:extLst>
+                  <a:ext uri="{FF2B5EF4-FFF2-40B4-BE49-F238E27FC236}">
+                    <a16:creationId xmlns:a16="http://schemas.microsoft.com/office/drawing/2014/main" id="{78CB79C2-C064-DF2B-126B-132F30571D52}"/>
+                  </a:ext>
+                </a:extLst>
+              </p:cNvPr>
+              <p:cNvPicPr/>
+              <p:nvPr/>
+            </p:nvPicPr>
+            <p:blipFill>
+              <a:blip r:embed="rId7"/>
+              <a:stretch>
+                <a:fillRect/>
+              </a:stretch>
+            </p:blipFill>
+            <p:spPr>
+              <a:xfrm>
+                <a:off x="3802476" y="1940601"/>
+                <a:ext cx="94320" cy="73440"/>
+              </a:xfrm>
+              <a:prstGeom prst="rect">
+                <a:avLst/>
+              </a:prstGeom>
+            </p:spPr>
+          </p:pic>
+        </mc:Fallback>
+      </mc:AlternateContent>
     </p:spTree>
   </p:cSld>
   <p:clrMapOvr>
@@ -12909,130 +12653,6 @@
       </p:sp>
       <p:sp>
         <p:nvSpPr>
-          <p:cNvPr id="101" name="Google Shape;101;p20"/>
-          <p:cNvSpPr txBox="1">
-            <a:spLocks noGrp="1"/>
-          </p:cNvSpPr>
-          <p:nvPr>
-            <p:ph type="body" idx="1"/>
-          </p:nvPr>
-        </p:nvSpPr>
-        <p:spPr>
-          <a:xfrm>
-            <a:off x="311700" y="864200"/>
-            <a:ext cx="8520600" cy="3416400"/>
-          </a:xfrm>
-          <a:prstGeom prst="rect">
-            <a:avLst/>
-          </a:prstGeom>
-        </p:spPr>
-        <p:txBody>
-          <a:bodyPr spcFirstLastPara="1" wrap="square" lIns="91425" tIns="91425" rIns="91425" bIns="91425" anchor="t" anchorCtr="0">
-            <a:normAutofit/>
-          </a:bodyPr>
-          <a:lstStyle/>
-          <a:p>
-            <a:pPr marL="457200" lvl="0" indent="-342900" algn="l" rtl="0">
-              <a:spcBef>
-                <a:spcPts val="0"/>
-              </a:spcBef>
-              <a:spcAft>
-                <a:spcPts val="0"/>
-              </a:spcAft>
-              <a:buSzPts val="1800"/>
-              <a:buChar char="●"/>
-            </a:pPr>
-            <a:r>
-              <a:rPr lang="en"/>
-              <a:t>3 Slides</a:t>
-            </a:r>
-            <a:endParaRPr/>
-          </a:p>
-          <a:p>
-            <a:pPr marL="914400" lvl="1" indent="-317500" algn="l" rtl="0">
-              <a:spcBef>
-                <a:spcPts val="0"/>
-              </a:spcBef>
-              <a:spcAft>
-                <a:spcPts val="0"/>
-              </a:spcAft>
-              <a:buSzPts val="1400"/>
-              <a:buChar char="○"/>
-            </a:pPr>
-            <a:r>
-              <a:rPr lang="en"/>
-              <a:t>DFD (Data Flow Diagram) Diagram</a:t>
-            </a:r>
-            <a:endParaRPr/>
-          </a:p>
-          <a:p>
-            <a:pPr marL="914400" lvl="1" indent="-317500" algn="l" rtl="0">
-              <a:spcBef>
-                <a:spcPts val="0"/>
-              </a:spcBef>
-              <a:spcAft>
-                <a:spcPts val="0"/>
-              </a:spcAft>
-              <a:buSzPts val="1400"/>
-              <a:buChar char="○"/>
-            </a:pPr>
-            <a:r>
-              <a:rPr lang="en"/>
-              <a:t>Use Case Diagram</a:t>
-            </a:r>
-            <a:endParaRPr/>
-          </a:p>
-          <a:p>
-            <a:pPr marL="914400" lvl="1" indent="-317500" algn="l" rtl="0">
-              <a:spcBef>
-                <a:spcPts val="0"/>
-              </a:spcBef>
-              <a:spcAft>
-                <a:spcPts val="0"/>
-              </a:spcAft>
-              <a:buSzPts val="1400"/>
-              <a:buChar char="○"/>
-            </a:pPr>
-            <a:r>
-              <a:rPr lang="en"/>
-              <a:t>ER Diagram (Entity Relationship Diagram) for database design</a:t>
-            </a:r>
-            <a:endParaRPr/>
-          </a:p>
-        </p:txBody>
-      </p:sp>
-      <p:pic>
-        <p:nvPicPr>
-          <p:cNvPr id="5" name="Picture 4">
-            <a:extLst>
-              <a:ext uri="{FF2B5EF4-FFF2-40B4-BE49-F238E27FC236}">
-                <a16:creationId xmlns:a16="http://schemas.microsoft.com/office/drawing/2014/main" id="{68A7AC17-D018-5D6D-6A56-17BE9B9B3813}"/>
-              </a:ext>
-            </a:extLst>
-          </p:cNvPr>
-          <p:cNvPicPr>
-            <a:picLocks noChangeAspect="1"/>
-          </p:cNvPicPr>
-          <p:nvPr/>
-        </p:nvPicPr>
-        <p:blipFill>
-          <a:blip r:embed="rId3"/>
-          <a:stretch>
-            <a:fillRect/>
-          </a:stretch>
-        </p:blipFill>
-        <p:spPr>
-          <a:xfrm>
-            <a:off x="0" y="-1"/>
-            <a:ext cx="9144000" cy="5203371"/>
-          </a:xfrm>
-          <a:prstGeom prst="rect">
-            <a:avLst/>
-          </a:prstGeom>
-        </p:spPr>
-      </p:pic>
-      <p:sp>
-        <p:nvSpPr>
           <p:cNvPr id="4" name="Google Shape;100;p20">
             <a:extLst>
               <a:ext uri="{FF2B5EF4-FFF2-40B4-BE49-F238E27FC236}">
@@ -13363,1146 +12983,9 @@
           </a:p>
         </p:txBody>
       </p:sp>
-      <mc:AlternateContent xmlns:mc="http://schemas.openxmlformats.org/markup-compatibility/2006">
-        <mc:Choice xmlns:p14="http://schemas.microsoft.com/office/powerpoint/2010/main" Requires="p14">
-          <p:contentPart p14:bwMode="auto" r:id="rId4">
-            <p14:nvContentPartPr>
-              <p14:cNvPr id="3" name="Ink 2">
-                <a:extLst>
-                  <a:ext uri="{FF2B5EF4-FFF2-40B4-BE49-F238E27FC236}">
-                    <a16:creationId xmlns:a16="http://schemas.microsoft.com/office/drawing/2014/main" id="{677DE9C2-5EEC-5F15-C8B2-72F2D03A6B1B}"/>
-                  </a:ext>
-                </a:extLst>
-              </p14:cNvPr>
-              <p14:cNvContentPartPr/>
-              <p14:nvPr/>
-            </p14:nvContentPartPr>
-            <p14:xfrm>
-              <a:off x="3591646" y="2192102"/>
-              <a:ext cx="2353320" cy="814320"/>
-            </p14:xfrm>
-          </p:contentPart>
-        </mc:Choice>
-        <mc:Fallback>
-          <p:pic>
-            <p:nvPicPr>
-              <p:cNvPr id="3" name="Ink 2">
-                <a:extLst>
-                  <a:ext uri="{FF2B5EF4-FFF2-40B4-BE49-F238E27FC236}">
-                    <a16:creationId xmlns:a16="http://schemas.microsoft.com/office/drawing/2014/main" id="{677DE9C2-5EEC-5F15-C8B2-72F2D03A6B1B}"/>
-                  </a:ext>
-                </a:extLst>
-              </p:cNvPr>
-              <p:cNvPicPr/>
-              <p:nvPr/>
-            </p:nvPicPr>
-            <p:blipFill>
-              <a:blip r:embed="rId5"/>
-              <a:stretch>
-                <a:fillRect/>
-              </a:stretch>
-            </p:blipFill>
-            <p:spPr>
-              <a:xfrm>
-                <a:off x="3529006" y="2129462"/>
-                <a:ext cx="2478960" cy="939960"/>
-              </a:xfrm>
-              <a:prstGeom prst="rect">
-                <a:avLst/>
-              </a:prstGeom>
-            </p:spPr>
-          </p:pic>
-        </mc:Fallback>
-      </mc:AlternateContent>
-      <mc:AlternateContent xmlns:mc="http://schemas.openxmlformats.org/markup-compatibility/2006">
-        <mc:Choice xmlns:p14="http://schemas.microsoft.com/office/powerpoint/2010/main" Requires="p14">
-          <p:contentPart p14:bwMode="auto" r:id="rId6">
-            <p14:nvContentPartPr>
-              <p14:cNvPr id="23" name="Ink 22">
-                <a:extLst>
-                  <a:ext uri="{FF2B5EF4-FFF2-40B4-BE49-F238E27FC236}">
-                    <a16:creationId xmlns:a16="http://schemas.microsoft.com/office/drawing/2014/main" id="{FC050256-AAA3-0B18-4F7B-9B86A894F19B}"/>
-                  </a:ext>
-                </a:extLst>
-              </p14:cNvPr>
-              <p14:cNvContentPartPr/>
-              <p14:nvPr/>
-            </p14:nvContentPartPr>
-            <p14:xfrm>
-              <a:off x="4448446" y="2392982"/>
-              <a:ext cx="1051920" cy="359280"/>
-            </p14:xfrm>
-          </p:contentPart>
-        </mc:Choice>
-        <mc:Fallback>
-          <p:pic>
-            <p:nvPicPr>
-              <p:cNvPr id="23" name="Ink 22">
-                <a:extLst>
-                  <a:ext uri="{FF2B5EF4-FFF2-40B4-BE49-F238E27FC236}">
-                    <a16:creationId xmlns:a16="http://schemas.microsoft.com/office/drawing/2014/main" id="{FC050256-AAA3-0B18-4F7B-9B86A894F19B}"/>
-                  </a:ext>
-                </a:extLst>
-              </p:cNvPr>
-              <p:cNvPicPr/>
-              <p:nvPr/>
-            </p:nvPicPr>
-            <p:blipFill>
-              <a:blip r:embed="rId7"/>
-              <a:stretch>
-                <a:fillRect/>
-              </a:stretch>
-            </p:blipFill>
-            <p:spPr>
-              <a:xfrm>
-                <a:off x="4385446" y="2329982"/>
-                <a:ext cx="1177560" cy="484920"/>
-              </a:xfrm>
-              <a:prstGeom prst="rect">
-                <a:avLst/>
-              </a:prstGeom>
-            </p:spPr>
-          </p:pic>
-        </mc:Fallback>
-      </mc:AlternateContent>
-      <mc:AlternateContent xmlns:mc="http://schemas.openxmlformats.org/markup-compatibility/2006">
-        <mc:Choice xmlns:p14="http://schemas.microsoft.com/office/powerpoint/2010/main" Requires="p14">
-          <p:contentPart p14:bwMode="auto" r:id="rId8">
-            <p14:nvContentPartPr>
-              <p14:cNvPr id="25" name="Ink 24">
-                <a:extLst>
-                  <a:ext uri="{FF2B5EF4-FFF2-40B4-BE49-F238E27FC236}">
-                    <a16:creationId xmlns:a16="http://schemas.microsoft.com/office/drawing/2014/main" id="{BEA08AAB-4CAA-7462-414D-1B003114E1EF}"/>
-                  </a:ext>
-                </a:extLst>
-              </p14:cNvPr>
-              <p14:cNvContentPartPr/>
-              <p14:nvPr/>
-            </p14:nvContentPartPr>
-            <p14:xfrm>
-              <a:off x="3591646" y="2113622"/>
-              <a:ext cx="2344320" cy="130680"/>
-            </p14:xfrm>
-          </p:contentPart>
-        </mc:Choice>
-        <mc:Fallback>
-          <p:pic>
-            <p:nvPicPr>
-              <p:cNvPr id="25" name="Ink 24">
-                <a:extLst>
-                  <a:ext uri="{FF2B5EF4-FFF2-40B4-BE49-F238E27FC236}">
-                    <a16:creationId xmlns:a16="http://schemas.microsoft.com/office/drawing/2014/main" id="{BEA08AAB-4CAA-7462-414D-1B003114E1EF}"/>
-                  </a:ext>
-                </a:extLst>
-              </p:cNvPr>
-              <p:cNvPicPr/>
-              <p:nvPr/>
-            </p:nvPicPr>
-            <p:blipFill>
-              <a:blip r:embed="rId9"/>
-              <a:stretch>
-                <a:fillRect/>
-              </a:stretch>
-            </p:blipFill>
-            <p:spPr>
-              <a:xfrm>
-                <a:off x="3529006" y="2050622"/>
-                <a:ext cx="2469960" cy="256320"/>
-              </a:xfrm>
-              <a:prstGeom prst="rect">
-                <a:avLst/>
-              </a:prstGeom>
-            </p:spPr>
-          </p:pic>
-        </mc:Fallback>
-      </mc:AlternateContent>
-      <mc:AlternateContent xmlns:mc="http://schemas.openxmlformats.org/markup-compatibility/2006">
-        <mc:Choice xmlns:p14="http://schemas.microsoft.com/office/powerpoint/2010/main" Requires="p14">
-          <p:contentPart p14:bwMode="auto" r:id="rId10">
-            <p14:nvContentPartPr>
-              <p14:cNvPr id="26" name="Ink 25">
-                <a:extLst>
-                  <a:ext uri="{FF2B5EF4-FFF2-40B4-BE49-F238E27FC236}">
-                    <a16:creationId xmlns:a16="http://schemas.microsoft.com/office/drawing/2014/main" id="{6EB96122-D90A-D86D-3EB8-902728ADC104}"/>
-                  </a:ext>
-                </a:extLst>
-              </p14:cNvPr>
-              <p14:cNvContentPartPr/>
-              <p14:nvPr/>
-            </p14:nvContentPartPr>
-            <p14:xfrm>
-              <a:off x="4223446" y="2106062"/>
-              <a:ext cx="752400" cy="15120"/>
-            </p14:xfrm>
-          </p:contentPart>
-        </mc:Choice>
-        <mc:Fallback>
-          <p:pic>
-            <p:nvPicPr>
-              <p:cNvPr id="26" name="Ink 25">
-                <a:extLst>
-                  <a:ext uri="{FF2B5EF4-FFF2-40B4-BE49-F238E27FC236}">
-                    <a16:creationId xmlns:a16="http://schemas.microsoft.com/office/drawing/2014/main" id="{6EB96122-D90A-D86D-3EB8-902728ADC104}"/>
-                  </a:ext>
-                </a:extLst>
-              </p:cNvPr>
-              <p:cNvPicPr/>
-              <p:nvPr/>
-            </p:nvPicPr>
-            <p:blipFill>
-              <a:blip r:embed="rId11"/>
-              <a:stretch>
-                <a:fillRect/>
-              </a:stretch>
-            </p:blipFill>
-            <p:spPr>
-              <a:xfrm>
-                <a:off x="4160446" y="2043062"/>
-                <a:ext cx="878040" cy="140760"/>
-              </a:xfrm>
-              <a:prstGeom prst="rect">
-                <a:avLst/>
-              </a:prstGeom>
-            </p:spPr>
-          </p:pic>
-        </mc:Fallback>
-      </mc:AlternateContent>
-      <p:grpSp>
-        <p:nvGrpSpPr>
-          <p:cNvPr id="31" name="Group 30">
-            <a:extLst>
-              <a:ext uri="{FF2B5EF4-FFF2-40B4-BE49-F238E27FC236}">
-                <a16:creationId xmlns:a16="http://schemas.microsoft.com/office/drawing/2014/main" id="{9FF681E1-CAB1-3DE5-A667-CAF4953C2592}"/>
-              </a:ext>
-            </a:extLst>
-          </p:cNvPr>
-          <p:cNvGrpSpPr/>
-          <p:nvPr/>
-        </p:nvGrpSpPr>
-        <p:grpSpPr>
-          <a:xfrm>
-            <a:off x="5776486" y="2019302"/>
-            <a:ext cx="471960" cy="189000"/>
-            <a:chOff x="5776486" y="2307577"/>
-            <a:chExt cx="471960" cy="189000"/>
-          </a:xfrm>
-        </p:grpSpPr>
-        <mc:AlternateContent xmlns:mc="http://schemas.openxmlformats.org/markup-compatibility/2006">
-          <mc:Choice xmlns:p14="http://schemas.microsoft.com/office/powerpoint/2010/main" Requires="p14">
-            <p:contentPart p14:bwMode="auto" r:id="rId12">
-              <p14:nvContentPartPr>
-                <p14:cNvPr id="16" name="Ink 15">
-                  <a:extLst>
-                    <a:ext uri="{FF2B5EF4-FFF2-40B4-BE49-F238E27FC236}">
-                      <a16:creationId xmlns:a16="http://schemas.microsoft.com/office/drawing/2014/main" id="{DFC738CC-8482-843B-D06C-C34C142D3DA4}"/>
-                    </a:ext>
-                  </a:extLst>
-                </p14:cNvPr>
-                <p14:cNvContentPartPr/>
-                <p14:nvPr/>
-              </p14:nvContentPartPr>
-              <p14:xfrm>
-                <a:off x="6052246" y="2496217"/>
-                <a:ext cx="360" cy="360"/>
-              </p14:xfrm>
-            </p:contentPart>
-          </mc:Choice>
-          <mc:Fallback>
-            <p:pic>
-              <p:nvPicPr>
-                <p:cNvPr id="16" name="Ink 15">
-                  <a:extLst>
-                    <a:ext uri="{FF2B5EF4-FFF2-40B4-BE49-F238E27FC236}">
-                      <a16:creationId xmlns:a16="http://schemas.microsoft.com/office/drawing/2014/main" id="{DFC738CC-8482-843B-D06C-C34C142D3DA4}"/>
-                    </a:ext>
-                  </a:extLst>
-                </p:cNvPr>
-                <p:cNvPicPr/>
-                <p:nvPr/>
-              </p:nvPicPr>
-              <p:blipFill>
-                <a:blip r:embed="rId13"/>
-                <a:stretch>
-                  <a:fillRect/>
-                </a:stretch>
-              </p:blipFill>
-              <p:spPr>
-                <a:xfrm>
-                  <a:off x="5989246" y="2433217"/>
-                  <a:ext cx="126000" cy="126000"/>
-                </a:xfrm>
-                <a:prstGeom prst="rect">
-                  <a:avLst/>
-                </a:prstGeom>
-              </p:spPr>
-            </p:pic>
-          </mc:Fallback>
-        </mc:AlternateContent>
-        <mc:AlternateContent xmlns:mc="http://schemas.openxmlformats.org/markup-compatibility/2006">
-          <mc:Choice xmlns:p14="http://schemas.microsoft.com/office/powerpoint/2010/main" Requires="p14">
-            <p:contentPart p14:bwMode="auto" r:id="rId14">
-              <p14:nvContentPartPr>
-                <p14:cNvPr id="17" name="Ink 16">
-                  <a:extLst>
-                    <a:ext uri="{FF2B5EF4-FFF2-40B4-BE49-F238E27FC236}">
-                      <a16:creationId xmlns:a16="http://schemas.microsoft.com/office/drawing/2014/main" id="{62E13F2E-BA03-E8A2-E04A-02452ADDCC77}"/>
-                    </a:ext>
-                  </a:extLst>
-                </p14:cNvPr>
-                <p14:cNvContentPartPr/>
-                <p14:nvPr/>
-              </p14:nvContentPartPr>
-              <p14:xfrm>
-                <a:off x="6139366" y="2467057"/>
-                <a:ext cx="360" cy="360"/>
-              </p14:xfrm>
-            </p:contentPart>
-          </mc:Choice>
-          <mc:Fallback>
-            <p:pic>
-              <p:nvPicPr>
-                <p:cNvPr id="17" name="Ink 16">
-                  <a:extLst>
-                    <a:ext uri="{FF2B5EF4-FFF2-40B4-BE49-F238E27FC236}">
-                      <a16:creationId xmlns:a16="http://schemas.microsoft.com/office/drawing/2014/main" id="{62E13F2E-BA03-E8A2-E04A-02452ADDCC77}"/>
-                    </a:ext>
-                  </a:extLst>
-                </p:cNvPr>
-                <p:cNvPicPr/>
-                <p:nvPr/>
-              </p:nvPicPr>
-              <p:blipFill>
-                <a:blip r:embed="rId13"/>
-                <a:stretch>
-                  <a:fillRect/>
-                </a:stretch>
-              </p:blipFill>
-              <p:spPr>
-                <a:xfrm>
-                  <a:off x="6076366" y="2404057"/>
-                  <a:ext cx="126000" cy="126000"/>
-                </a:xfrm>
-                <a:prstGeom prst="rect">
-                  <a:avLst/>
-                </a:prstGeom>
-              </p:spPr>
-            </p:pic>
-          </mc:Fallback>
-        </mc:AlternateContent>
-        <mc:AlternateContent xmlns:mc="http://schemas.openxmlformats.org/markup-compatibility/2006">
-          <mc:Choice xmlns:p14="http://schemas.microsoft.com/office/powerpoint/2010/main" Requires="p14">
-            <p:contentPart p14:bwMode="auto" r:id="rId15">
-              <p14:nvContentPartPr>
-                <p14:cNvPr id="18" name="Ink 17">
-                  <a:extLst>
-                    <a:ext uri="{FF2B5EF4-FFF2-40B4-BE49-F238E27FC236}">
-                      <a16:creationId xmlns:a16="http://schemas.microsoft.com/office/drawing/2014/main" id="{F73B8713-D5FE-FBF5-B2D0-C83C279C0498}"/>
-                    </a:ext>
-                  </a:extLst>
-                </p14:cNvPr>
-                <p14:cNvContentPartPr/>
-                <p14:nvPr/>
-              </p14:nvContentPartPr>
-              <p14:xfrm>
-                <a:off x="6175726" y="2459857"/>
-                <a:ext cx="360" cy="360"/>
-              </p14:xfrm>
-            </p:contentPart>
-          </mc:Choice>
-          <mc:Fallback>
-            <p:pic>
-              <p:nvPicPr>
-                <p:cNvPr id="18" name="Ink 17">
-                  <a:extLst>
-                    <a:ext uri="{FF2B5EF4-FFF2-40B4-BE49-F238E27FC236}">
-                      <a16:creationId xmlns:a16="http://schemas.microsoft.com/office/drawing/2014/main" id="{F73B8713-D5FE-FBF5-B2D0-C83C279C0498}"/>
-                    </a:ext>
-                  </a:extLst>
-                </p:cNvPr>
-                <p:cNvPicPr/>
-                <p:nvPr/>
-              </p:nvPicPr>
-              <p:blipFill>
-                <a:blip r:embed="rId13"/>
-                <a:stretch>
-                  <a:fillRect/>
-                </a:stretch>
-              </p:blipFill>
-              <p:spPr>
-                <a:xfrm>
-                  <a:off x="6112726" y="2396857"/>
-                  <a:ext cx="126000" cy="126000"/>
-                </a:xfrm>
-                <a:prstGeom prst="rect">
-                  <a:avLst/>
-                </a:prstGeom>
-              </p:spPr>
-            </p:pic>
-          </mc:Fallback>
-        </mc:AlternateContent>
-        <mc:AlternateContent xmlns:mc="http://schemas.openxmlformats.org/markup-compatibility/2006">
-          <mc:Choice xmlns:p14="http://schemas.microsoft.com/office/powerpoint/2010/main" Requires="p14">
-            <p:contentPart p14:bwMode="auto" r:id="rId16">
-              <p14:nvContentPartPr>
-                <p14:cNvPr id="19" name="Ink 18">
-                  <a:extLst>
-                    <a:ext uri="{FF2B5EF4-FFF2-40B4-BE49-F238E27FC236}">
-                      <a16:creationId xmlns:a16="http://schemas.microsoft.com/office/drawing/2014/main" id="{6394CAF0-08F9-EB19-7523-0AB6C40570DC}"/>
-                    </a:ext>
-                  </a:extLst>
-                </p14:cNvPr>
-                <p14:cNvContentPartPr/>
-                <p14:nvPr/>
-              </p14:nvContentPartPr>
-              <p14:xfrm>
-                <a:off x="6190126" y="2459857"/>
-                <a:ext cx="360" cy="360"/>
-              </p14:xfrm>
-            </p:contentPart>
-          </mc:Choice>
-          <mc:Fallback>
-            <p:pic>
-              <p:nvPicPr>
-                <p:cNvPr id="19" name="Ink 18">
-                  <a:extLst>
-                    <a:ext uri="{FF2B5EF4-FFF2-40B4-BE49-F238E27FC236}">
-                      <a16:creationId xmlns:a16="http://schemas.microsoft.com/office/drawing/2014/main" id="{6394CAF0-08F9-EB19-7523-0AB6C40570DC}"/>
-                    </a:ext>
-                  </a:extLst>
-                </p:cNvPr>
-                <p:cNvPicPr/>
-                <p:nvPr/>
-              </p:nvPicPr>
-              <p:blipFill>
-                <a:blip r:embed="rId13"/>
-                <a:stretch>
-                  <a:fillRect/>
-                </a:stretch>
-              </p:blipFill>
-              <p:spPr>
-                <a:xfrm>
-                  <a:off x="6127126" y="2396857"/>
-                  <a:ext cx="126000" cy="126000"/>
-                </a:xfrm>
-                <a:prstGeom prst="rect">
-                  <a:avLst/>
-                </a:prstGeom>
-              </p:spPr>
-            </p:pic>
-          </mc:Fallback>
-        </mc:AlternateContent>
-        <mc:AlternateContent xmlns:mc="http://schemas.openxmlformats.org/markup-compatibility/2006">
-          <mc:Choice xmlns:p14="http://schemas.microsoft.com/office/powerpoint/2010/main" Requires="p14">
-            <p:contentPart p14:bwMode="auto" r:id="rId17">
-              <p14:nvContentPartPr>
-                <p14:cNvPr id="20" name="Ink 19">
-                  <a:extLst>
-                    <a:ext uri="{FF2B5EF4-FFF2-40B4-BE49-F238E27FC236}">
-                      <a16:creationId xmlns:a16="http://schemas.microsoft.com/office/drawing/2014/main" id="{F4265347-9AE7-BCC2-6C41-014495B484E4}"/>
-                    </a:ext>
-                  </a:extLst>
-                </p14:cNvPr>
-                <p14:cNvContentPartPr/>
-                <p14:nvPr/>
-              </p14:nvContentPartPr>
-              <p14:xfrm>
-                <a:off x="6248086" y="2452657"/>
-                <a:ext cx="360" cy="360"/>
-              </p14:xfrm>
-            </p:contentPart>
-          </mc:Choice>
-          <mc:Fallback>
-            <p:pic>
-              <p:nvPicPr>
-                <p:cNvPr id="20" name="Ink 19">
-                  <a:extLst>
-                    <a:ext uri="{FF2B5EF4-FFF2-40B4-BE49-F238E27FC236}">
-                      <a16:creationId xmlns:a16="http://schemas.microsoft.com/office/drawing/2014/main" id="{F4265347-9AE7-BCC2-6C41-014495B484E4}"/>
-                    </a:ext>
-                  </a:extLst>
-                </p:cNvPr>
-                <p:cNvPicPr/>
-                <p:nvPr/>
-              </p:nvPicPr>
-              <p:blipFill>
-                <a:blip r:embed="rId13"/>
-                <a:stretch>
-                  <a:fillRect/>
-                </a:stretch>
-              </p:blipFill>
-              <p:spPr>
-                <a:xfrm>
-                  <a:off x="6185086" y="2389657"/>
-                  <a:ext cx="126000" cy="126000"/>
-                </a:xfrm>
-                <a:prstGeom prst="rect">
-                  <a:avLst/>
-                </a:prstGeom>
-              </p:spPr>
-            </p:pic>
-          </mc:Fallback>
-        </mc:AlternateContent>
-        <mc:AlternateContent xmlns:mc="http://schemas.openxmlformats.org/markup-compatibility/2006">
-          <mc:Choice xmlns:p14="http://schemas.microsoft.com/office/powerpoint/2010/main" Requires="p14">
-            <p:contentPart p14:bwMode="auto" r:id="rId18">
-              <p14:nvContentPartPr>
-                <p14:cNvPr id="21" name="Ink 20">
-                  <a:extLst>
-                    <a:ext uri="{FF2B5EF4-FFF2-40B4-BE49-F238E27FC236}">
-                      <a16:creationId xmlns:a16="http://schemas.microsoft.com/office/drawing/2014/main" id="{2267423D-2B3F-E96F-2084-892FBC7DF95D}"/>
-                    </a:ext>
-                  </a:extLst>
-                </p14:cNvPr>
-                <p14:cNvContentPartPr/>
-                <p14:nvPr/>
-              </p14:nvContentPartPr>
-              <p14:xfrm>
-                <a:off x="6248086" y="2452657"/>
-                <a:ext cx="360" cy="360"/>
-              </p14:xfrm>
-            </p:contentPart>
-          </mc:Choice>
-          <mc:Fallback>
-            <p:pic>
-              <p:nvPicPr>
-                <p:cNvPr id="21" name="Ink 20">
-                  <a:extLst>
-                    <a:ext uri="{FF2B5EF4-FFF2-40B4-BE49-F238E27FC236}">
-                      <a16:creationId xmlns:a16="http://schemas.microsoft.com/office/drawing/2014/main" id="{2267423D-2B3F-E96F-2084-892FBC7DF95D}"/>
-                    </a:ext>
-                  </a:extLst>
-                </p:cNvPr>
-                <p:cNvPicPr/>
-                <p:nvPr/>
-              </p:nvPicPr>
-              <p:blipFill>
-                <a:blip r:embed="rId13"/>
-                <a:stretch>
-                  <a:fillRect/>
-                </a:stretch>
-              </p:blipFill>
-              <p:spPr>
-                <a:xfrm>
-                  <a:off x="6185086" y="2389657"/>
-                  <a:ext cx="126000" cy="126000"/>
-                </a:xfrm>
-                <a:prstGeom prst="rect">
-                  <a:avLst/>
-                </a:prstGeom>
-              </p:spPr>
-            </p:pic>
-          </mc:Fallback>
-        </mc:AlternateContent>
-        <mc:AlternateContent xmlns:mc="http://schemas.openxmlformats.org/markup-compatibility/2006">
-          <mc:Choice xmlns:p14="http://schemas.microsoft.com/office/powerpoint/2010/main" Requires="p14">
-            <p:contentPart p14:bwMode="auto" r:id="rId19">
-              <p14:nvContentPartPr>
-                <p14:cNvPr id="27" name="Ink 26">
-                  <a:extLst>
-                    <a:ext uri="{FF2B5EF4-FFF2-40B4-BE49-F238E27FC236}">
-                      <a16:creationId xmlns:a16="http://schemas.microsoft.com/office/drawing/2014/main" id="{F3AA8DFD-5FDE-FE73-5365-470FB4EEB826}"/>
-                    </a:ext>
-                  </a:extLst>
-                </p14:cNvPr>
-                <p14:cNvContentPartPr/>
-                <p14:nvPr/>
-              </p14:nvContentPartPr>
-              <p14:xfrm>
-                <a:off x="5863606" y="2307577"/>
-                <a:ext cx="360" cy="360"/>
-              </p14:xfrm>
-            </p:contentPart>
-          </mc:Choice>
-          <mc:Fallback>
-            <p:pic>
-              <p:nvPicPr>
-                <p:cNvPr id="27" name="Ink 26">
-                  <a:extLst>
-                    <a:ext uri="{FF2B5EF4-FFF2-40B4-BE49-F238E27FC236}">
-                      <a16:creationId xmlns:a16="http://schemas.microsoft.com/office/drawing/2014/main" id="{F3AA8DFD-5FDE-FE73-5365-470FB4EEB826}"/>
-                    </a:ext>
-                  </a:extLst>
-                </p:cNvPr>
-                <p:cNvPicPr/>
-                <p:nvPr/>
-              </p:nvPicPr>
-              <p:blipFill>
-                <a:blip r:embed="rId13"/>
-                <a:stretch>
-                  <a:fillRect/>
-                </a:stretch>
-              </p:blipFill>
-              <p:spPr>
-                <a:xfrm>
-                  <a:off x="5800606" y="2244937"/>
-                  <a:ext cx="126000" cy="126000"/>
-                </a:xfrm>
-                <a:prstGeom prst="rect">
-                  <a:avLst/>
-                </a:prstGeom>
-              </p:spPr>
-            </p:pic>
-          </mc:Fallback>
-        </mc:AlternateContent>
-        <mc:AlternateContent xmlns:mc="http://schemas.openxmlformats.org/markup-compatibility/2006">
-          <mc:Choice xmlns:p14="http://schemas.microsoft.com/office/powerpoint/2010/main" Requires="p14">
-            <p:contentPart p14:bwMode="auto" r:id="rId20">
-              <p14:nvContentPartPr>
-                <p14:cNvPr id="28" name="Ink 27">
-                  <a:extLst>
-                    <a:ext uri="{FF2B5EF4-FFF2-40B4-BE49-F238E27FC236}">
-                      <a16:creationId xmlns:a16="http://schemas.microsoft.com/office/drawing/2014/main" id="{07AD7F9A-4692-5F55-9A8F-476A7BD0BD4D}"/>
-                    </a:ext>
-                  </a:extLst>
-                </p14:cNvPr>
-                <p14:cNvContentPartPr/>
-                <p14:nvPr/>
-              </p14:nvContentPartPr>
-              <p14:xfrm>
-                <a:off x="5776486" y="2314777"/>
-                <a:ext cx="360" cy="360"/>
-              </p14:xfrm>
-            </p:contentPart>
-          </mc:Choice>
-          <mc:Fallback>
-            <p:pic>
-              <p:nvPicPr>
-                <p:cNvPr id="28" name="Ink 27">
-                  <a:extLst>
-                    <a:ext uri="{FF2B5EF4-FFF2-40B4-BE49-F238E27FC236}">
-                      <a16:creationId xmlns:a16="http://schemas.microsoft.com/office/drawing/2014/main" id="{07AD7F9A-4692-5F55-9A8F-476A7BD0BD4D}"/>
-                    </a:ext>
-                  </a:extLst>
-                </p:cNvPr>
-                <p:cNvPicPr/>
-                <p:nvPr/>
-              </p:nvPicPr>
-              <p:blipFill>
-                <a:blip r:embed="rId13"/>
-                <a:stretch>
-                  <a:fillRect/>
-                </a:stretch>
-              </p:blipFill>
-              <p:spPr>
-                <a:xfrm>
-                  <a:off x="5713846" y="2252137"/>
-                  <a:ext cx="126000" cy="126000"/>
-                </a:xfrm>
-                <a:prstGeom prst="rect">
-                  <a:avLst/>
-                </a:prstGeom>
-              </p:spPr>
-            </p:pic>
-          </mc:Fallback>
-        </mc:AlternateContent>
-        <mc:AlternateContent xmlns:mc="http://schemas.openxmlformats.org/markup-compatibility/2006">
-          <mc:Choice xmlns:p14="http://schemas.microsoft.com/office/powerpoint/2010/main" Requires="p14">
-            <p:contentPart p14:bwMode="auto" r:id="rId21">
-              <p14:nvContentPartPr>
-                <p14:cNvPr id="30" name="Ink 29">
-                  <a:extLst>
-                    <a:ext uri="{FF2B5EF4-FFF2-40B4-BE49-F238E27FC236}">
-                      <a16:creationId xmlns:a16="http://schemas.microsoft.com/office/drawing/2014/main" id="{61B7B138-7535-CD1A-1926-A4CFDDC3900A}"/>
-                    </a:ext>
-                  </a:extLst>
-                </p14:cNvPr>
-                <p14:cNvContentPartPr/>
-                <p14:nvPr/>
-              </p14:nvContentPartPr>
-              <p14:xfrm>
-                <a:off x="5907166" y="2358337"/>
-                <a:ext cx="360" cy="360"/>
-              </p14:xfrm>
-            </p:contentPart>
-          </mc:Choice>
-          <mc:Fallback>
-            <p:pic>
-              <p:nvPicPr>
-                <p:cNvPr id="30" name="Ink 29">
-                  <a:extLst>
-                    <a:ext uri="{FF2B5EF4-FFF2-40B4-BE49-F238E27FC236}">
-                      <a16:creationId xmlns:a16="http://schemas.microsoft.com/office/drawing/2014/main" id="{61B7B138-7535-CD1A-1926-A4CFDDC3900A}"/>
-                    </a:ext>
-                  </a:extLst>
-                </p:cNvPr>
-                <p:cNvPicPr/>
-                <p:nvPr/>
-              </p:nvPicPr>
-              <p:blipFill>
-                <a:blip r:embed="rId13"/>
-                <a:stretch>
-                  <a:fillRect/>
-                </a:stretch>
-              </p:blipFill>
-              <p:spPr>
-                <a:xfrm>
-                  <a:off x="5844166" y="2295337"/>
-                  <a:ext cx="126000" cy="126000"/>
-                </a:xfrm>
-                <a:prstGeom prst="rect">
-                  <a:avLst/>
-                </a:prstGeom>
-              </p:spPr>
-            </p:pic>
-          </mc:Fallback>
-        </mc:AlternateContent>
-      </p:grpSp>
-      <p:cxnSp>
-        <p:nvCxnSpPr>
-          <p:cNvPr id="33" name="Straight Connector 32">
-            <a:extLst>
-              <a:ext uri="{FF2B5EF4-FFF2-40B4-BE49-F238E27FC236}">
-                <a16:creationId xmlns:a16="http://schemas.microsoft.com/office/drawing/2014/main" id="{B43E4CD3-4C39-7584-7C66-8FD038C464E8}"/>
-              </a:ext>
-            </a:extLst>
-          </p:cNvPr>
-          <p:cNvCxnSpPr>
-            <a:cxnSpLocks/>
-          </p:cNvCxnSpPr>
-          <p:nvPr/>
-        </p:nvCxnSpPr>
-        <p:spPr>
-          <a:xfrm flipV="1">
-            <a:off x="3489960" y="1609105"/>
-            <a:ext cx="4982498" cy="1397317"/>
-          </a:xfrm>
-          <a:prstGeom prst="line">
-            <a:avLst/>
-          </a:prstGeom>
-          <a:ln/>
-        </p:spPr>
-        <p:style>
-          <a:lnRef idx="1">
-            <a:schemeClr val="accent2"/>
-          </a:lnRef>
-          <a:fillRef idx="0">
-            <a:schemeClr val="accent2"/>
-          </a:fillRef>
-          <a:effectRef idx="0">
-            <a:schemeClr val="accent2"/>
-          </a:effectRef>
-          <a:fontRef idx="minor">
-            <a:schemeClr val="tx1"/>
-          </a:fontRef>
-        </p:style>
-      </p:cxnSp>
-      <p:cxnSp>
-        <p:nvCxnSpPr>
-          <p:cNvPr id="37" name="Straight Connector 36">
-            <a:extLst>
-              <a:ext uri="{FF2B5EF4-FFF2-40B4-BE49-F238E27FC236}">
-                <a16:creationId xmlns:a16="http://schemas.microsoft.com/office/drawing/2014/main" id="{C6684EA2-BC5F-6E16-AEAF-75CED2A133ED}"/>
-              </a:ext>
-            </a:extLst>
-          </p:cNvPr>
-          <p:cNvCxnSpPr/>
-          <p:nvPr/>
-        </p:nvCxnSpPr>
-        <p:spPr>
-          <a:xfrm flipV="1">
-            <a:off x="3489960" y="1609105"/>
-            <a:ext cx="4982498" cy="674370"/>
-          </a:xfrm>
-          <a:prstGeom prst="line">
-            <a:avLst/>
-          </a:prstGeom>
-        </p:spPr>
-        <p:style>
-          <a:lnRef idx="1">
-            <a:schemeClr val="dk1"/>
-          </a:lnRef>
-          <a:fillRef idx="0">
-            <a:schemeClr val="dk1"/>
-          </a:fillRef>
-          <a:effectRef idx="0">
-            <a:schemeClr val="dk1"/>
-          </a:effectRef>
-          <a:fontRef idx="minor">
-            <a:schemeClr val="tx1"/>
-          </a:fontRef>
-        </p:style>
-      </p:cxnSp>
-      <mc:AlternateContent xmlns:mc="http://schemas.openxmlformats.org/markup-compatibility/2006">
-        <mc:Choice xmlns:p14="http://schemas.microsoft.com/office/powerpoint/2010/main" Requires="p14">
-          <p:contentPart p14:bwMode="auto" r:id="rId22">
-            <p14:nvContentPartPr>
-              <p14:cNvPr id="42" name="Ink 41">
-                <a:extLst>
-                  <a:ext uri="{FF2B5EF4-FFF2-40B4-BE49-F238E27FC236}">
-                    <a16:creationId xmlns:a16="http://schemas.microsoft.com/office/drawing/2014/main" id="{FC55A1B8-2FDF-F117-D98C-557FA3F437E7}"/>
-                  </a:ext>
-                </a:extLst>
-              </p14:cNvPr>
-              <p14:cNvContentPartPr/>
-              <p14:nvPr/>
-            </p14:nvContentPartPr>
-            <p14:xfrm>
-              <a:off x="6567371" y="2084314"/>
-              <a:ext cx="37440" cy="72000"/>
-            </p14:xfrm>
-          </p:contentPart>
-        </mc:Choice>
-        <mc:Fallback>
-          <p:pic>
-            <p:nvPicPr>
-              <p:cNvPr id="42" name="Ink 41">
-                <a:extLst>
-                  <a:ext uri="{FF2B5EF4-FFF2-40B4-BE49-F238E27FC236}">
-                    <a16:creationId xmlns:a16="http://schemas.microsoft.com/office/drawing/2014/main" id="{FC55A1B8-2FDF-F117-D98C-557FA3F437E7}"/>
-                  </a:ext>
-                </a:extLst>
-              </p:cNvPr>
-              <p:cNvPicPr/>
-              <p:nvPr/>
-            </p:nvPicPr>
-            <p:blipFill>
-              <a:blip r:embed="rId23"/>
-              <a:stretch>
-                <a:fillRect/>
-              </a:stretch>
-            </p:blipFill>
-            <p:spPr>
-              <a:xfrm>
-                <a:off x="6561251" y="2078194"/>
-                <a:ext cx="49680" cy="84240"/>
-              </a:xfrm>
-              <a:prstGeom prst="rect">
-                <a:avLst/>
-              </a:prstGeom>
-            </p:spPr>
-          </p:pic>
-        </mc:Fallback>
-      </mc:AlternateContent>
-      <mc:AlternateContent xmlns:mc="http://schemas.openxmlformats.org/markup-compatibility/2006">
-        <mc:Choice xmlns:p14="http://schemas.microsoft.com/office/powerpoint/2010/main" Requires="p14">
-          <p:contentPart p14:bwMode="auto" r:id="rId24">
-            <p14:nvContentPartPr>
-              <p14:cNvPr id="43" name="Ink 42">
-                <a:extLst>
-                  <a:ext uri="{FF2B5EF4-FFF2-40B4-BE49-F238E27FC236}">
-                    <a16:creationId xmlns:a16="http://schemas.microsoft.com/office/drawing/2014/main" id="{42291266-2D64-C83C-E20D-19ADBDA307E2}"/>
-                  </a:ext>
-                </a:extLst>
-              </p14:cNvPr>
-              <p14:cNvContentPartPr/>
-              <p14:nvPr/>
-            </p14:nvContentPartPr>
-            <p14:xfrm>
-              <a:off x="6770771" y="2062714"/>
-              <a:ext cx="153720" cy="80280"/>
-            </p14:xfrm>
-          </p:contentPart>
-        </mc:Choice>
-        <mc:Fallback>
-          <p:pic>
-            <p:nvPicPr>
-              <p:cNvPr id="43" name="Ink 42">
-                <a:extLst>
-                  <a:ext uri="{FF2B5EF4-FFF2-40B4-BE49-F238E27FC236}">
-                    <a16:creationId xmlns:a16="http://schemas.microsoft.com/office/drawing/2014/main" id="{42291266-2D64-C83C-E20D-19ADBDA307E2}"/>
-                  </a:ext>
-                </a:extLst>
-              </p:cNvPr>
-              <p:cNvPicPr/>
-              <p:nvPr/>
-            </p:nvPicPr>
-            <p:blipFill>
-              <a:blip r:embed="rId25"/>
-              <a:stretch>
-                <a:fillRect/>
-              </a:stretch>
-            </p:blipFill>
-            <p:spPr>
-              <a:xfrm>
-                <a:off x="6764651" y="2056594"/>
-                <a:ext cx="165960" cy="92520"/>
-              </a:xfrm>
-              <a:prstGeom prst="rect">
-                <a:avLst/>
-              </a:prstGeom>
-            </p:spPr>
-          </p:pic>
-        </mc:Fallback>
-      </mc:AlternateContent>
-      <p:grpSp>
-        <p:nvGrpSpPr>
-          <p:cNvPr id="52" name="Group 51">
-            <a:extLst>
-              <a:ext uri="{FF2B5EF4-FFF2-40B4-BE49-F238E27FC236}">
-                <a16:creationId xmlns:a16="http://schemas.microsoft.com/office/drawing/2014/main" id="{C4FA904D-54C0-0E38-65BC-361EDD95AB83}"/>
-              </a:ext>
-            </a:extLst>
-          </p:cNvPr>
-          <p:cNvGrpSpPr/>
-          <p:nvPr/>
-        </p:nvGrpSpPr>
-        <p:grpSpPr>
-          <a:xfrm>
-            <a:off x="4956371" y="1548274"/>
-            <a:ext cx="233280" cy="256320"/>
-            <a:chOff x="4956371" y="1836549"/>
-            <a:chExt cx="233280" cy="256320"/>
-          </a:xfrm>
-        </p:grpSpPr>
-        <mc:AlternateContent xmlns:mc="http://schemas.openxmlformats.org/markup-compatibility/2006">
-          <mc:Choice xmlns:p14="http://schemas.microsoft.com/office/powerpoint/2010/main" Requires="p14">
-            <p:contentPart p14:bwMode="auto" r:id="rId26">
-              <p14:nvContentPartPr>
-                <p14:cNvPr id="46" name="Ink 45">
-                  <a:extLst>
-                    <a:ext uri="{FF2B5EF4-FFF2-40B4-BE49-F238E27FC236}">
-                      <a16:creationId xmlns:a16="http://schemas.microsoft.com/office/drawing/2014/main" id="{13E3CC6E-C09A-D41B-FB36-9DDDF0969868}"/>
-                    </a:ext>
-                  </a:extLst>
-                </p14:cNvPr>
-                <p14:cNvContentPartPr/>
-                <p14:nvPr/>
-              </p14:nvContentPartPr>
-              <p14:xfrm>
-                <a:off x="5123051" y="1836549"/>
-                <a:ext cx="22320" cy="64800"/>
-              </p14:xfrm>
-            </p:contentPart>
-          </mc:Choice>
-          <mc:Fallback>
-            <p:pic>
-              <p:nvPicPr>
-                <p:cNvPr id="46" name="Ink 45">
-                  <a:extLst>
-                    <a:ext uri="{FF2B5EF4-FFF2-40B4-BE49-F238E27FC236}">
-                      <a16:creationId xmlns:a16="http://schemas.microsoft.com/office/drawing/2014/main" id="{13E3CC6E-C09A-D41B-FB36-9DDDF0969868}"/>
-                    </a:ext>
-                  </a:extLst>
-                </p:cNvPr>
-                <p:cNvPicPr/>
-                <p:nvPr/>
-              </p:nvPicPr>
-              <p:blipFill>
-                <a:blip r:embed="rId27"/>
-                <a:stretch>
-                  <a:fillRect/>
-                </a:stretch>
-              </p:blipFill>
-              <p:spPr>
-                <a:xfrm>
-                  <a:off x="5116931" y="1830429"/>
-                  <a:ext cx="34560" cy="77040"/>
-                </a:xfrm>
-                <a:prstGeom prst="rect">
-                  <a:avLst/>
-                </a:prstGeom>
-              </p:spPr>
-            </p:pic>
-          </mc:Fallback>
-        </mc:AlternateContent>
-        <mc:AlternateContent xmlns:mc="http://schemas.openxmlformats.org/markup-compatibility/2006">
-          <mc:Choice xmlns:p14="http://schemas.microsoft.com/office/powerpoint/2010/main" Requires="p14">
-            <p:contentPart p14:bwMode="auto" r:id="rId28">
-              <p14:nvContentPartPr>
-                <p14:cNvPr id="47" name="Ink 46">
-                  <a:extLst>
-                    <a:ext uri="{FF2B5EF4-FFF2-40B4-BE49-F238E27FC236}">
-                      <a16:creationId xmlns:a16="http://schemas.microsoft.com/office/drawing/2014/main" id="{DF142724-AB4E-B6EC-52E6-F29CF8ECEC7B}"/>
-                    </a:ext>
-                  </a:extLst>
-                </p14:cNvPr>
-                <p14:cNvContentPartPr/>
-                <p14:nvPr/>
-              </p14:nvContentPartPr>
-              <p14:xfrm>
-                <a:off x="5123051" y="1908549"/>
-                <a:ext cx="66600" cy="6120"/>
-              </p14:xfrm>
-            </p:contentPart>
-          </mc:Choice>
-          <mc:Fallback>
-            <p:pic>
-              <p:nvPicPr>
-                <p:cNvPr id="47" name="Ink 46">
-                  <a:extLst>
-                    <a:ext uri="{FF2B5EF4-FFF2-40B4-BE49-F238E27FC236}">
-                      <a16:creationId xmlns:a16="http://schemas.microsoft.com/office/drawing/2014/main" id="{DF142724-AB4E-B6EC-52E6-F29CF8ECEC7B}"/>
-                    </a:ext>
-                  </a:extLst>
-                </p:cNvPr>
-                <p:cNvPicPr/>
-                <p:nvPr/>
-              </p:nvPicPr>
-              <p:blipFill>
-                <a:blip r:embed="rId29"/>
-                <a:stretch>
-                  <a:fillRect/>
-                </a:stretch>
-              </p:blipFill>
-              <p:spPr>
-                <a:xfrm>
-                  <a:off x="5116931" y="1902429"/>
-                  <a:ext cx="78840" cy="18360"/>
-                </a:xfrm>
-                <a:prstGeom prst="rect">
-                  <a:avLst/>
-                </a:prstGeom>
-              </p:spPr>
-            </p:pic>
-          </mc:Fallback>
-        </mc:AlternateContent>
-        <mc:AlternateContent xmlns:mc="http://schemas.openxmlformats.org/markup-compatibility/2006">
-          <mc:Choice xmlns:p14="http://schemas.microsoft.com/office/powerpoint/2010/main" Requires="p14">
-            <p:contentPart p14:bwMode="auto" r:id="rId30">
-              <p14:nvContentPartPr>
-                <p14:cNvPr id="49" name="Ink 48">
-                  <a:extLst>
-                    <a:ext uri="{FF2B5EF4-FFF2-40B4-BE49-F238E27FC236}">
-                      <a16:creationId xmlns:a16="http://schemas.microsoft.com/office/drawing/2014/main" id="{3AB16949-13E1-D687-DCED-58133D52C709}"/>
-                    </a:ext>
-                  </a:extLst>
-                </p14:cNvPr>
-                <p14:cNvContentPartPr/>
-                <p14:nvPr/>
-              </p14:nvContentPartPr>
-              <p14:xfrm>
-                <a:off x="4985531" y="1992069"/>
-                <a:ext cx="69120" cy="47160"/>
-              </p14:xfrm>
-            </p:contentPart>
-          </mc:Choice>
-          <mc:Fallback>
-            <p:pic>
-              <p:nvPicPr>
-                <p:cNvPr id="49" name="Ink 48">
-                  <a:extLst>
-                    <a:ext uri="{FF2B5EF4-FFF2-40B4-BE49-F238E27FC236}">
-                      <a16:creationId xmlns:a16="http://schemas.microsoft.com/office/drawing/2014/main" id="{3AB16949-13E1-D687-DCED-58133D52C709}"/>
-                    </a:ext>
-                  </a:extLst>
-                </p:cNvPr>
-                <p:cNvPicPr/>
-                <p:nvPr/>
-              </p:nvPicPr>
-              <p:blipFill>
-                <a:blip r:embed="rId31"/>
-                <a:stretch>
-                  <a:fillRect/>
-                </a:stretch>
-              </p:blipFill>
-              <p:spPr>
-                <a:xfrm>
-                  <a:off x="4979411" y="1985949"/>
-                  <a:ext cx="81360" cy="59400"/>
-                </a:xfrm>
-                <a:prstGeom prst="rect">
-                  <a:avLst/>
-                </a:prstGeom>
-              </p:spPr>
-            </p:pic>
-          </mc:Fallback>
-        </mc:AlternateContent>
-        <mc:AlternateContent xmlns:mc="http://schemas.openxmlformats.org/markup-compatibility/2006">
-          <mc:Choice xmlns:p14="http://schemas.microsoft.com/office/powerpoint/2010/main" Requires="p14">
-            <p:contentPart p14:bwMode="auto" r:id="rId32">
-              <p14:nvContentPartPr>
-                <p14:cNvPr id="50" name="Ink 49">
-                  <a:extLst>
-                    <a:ext uri="{FF2B5EF4-FFF2-40B4-BE49-F238E27FC236}">
-                      <a16:creationId xmlns:a16="http://schemas.microsoft.com/office/drawing/2014/main" id="{6E076661-FD84-519E-E82A-32C053E2B0DA}"/>
-                    </a:ext>
-                  </a:extLst>
-                </p14:cNvPr>
-                <p14:cNvContentPartPr/>
-                <p14:nvPr/>
-              </p14:nvContentPartPr>
-              <p14:xfrm>
-                <a:off x="4971131" y="2031309"/>
-                <a:ext cx="93600" cy="22320"/>
-              </p14:xfrm>
-            </p:contentPart>
-          </mc:Choice>
-          <mc:Fallback>
-            <p:pic>
-              <p:nvPicPr>
-                <p:cNvPr id="50" name="Ink 49">
-                  <a:extLst>
-                    <a:ext uri="{FF2B5EF4-FFF2-40B4-BE49-F238E27FC236}">
-                      <a16:creationId xmlns:a16="http://schemas.microsoft.com/office/drawing/2014/main" id="{6E076661-FD84-519E-E82A-32C053E2B0DA}"/>
-                    </a:ext>
-                  </a:extLst>
-                </p:cNvPr>
-                <p:cNvPicPr/>
-                <p:nvPr/>
-              </p:nvPicPr>
-              <p:blipFill>
-                <a:blip r:embed="rId33"/>
-                <a:stretch>
-                  <a:fillRect/>
-                </a:stretch>
-              </p:blipFill>
-              <p:spPr>
-                <a:xfrm>
-                  <a:off x="4965011" y="2025189"/>
-                  <a:ext cx="105840" cy="34560"/>
-                </a:xfrm>
-                <a:prstGeom prst="rect">
-                  <a:avLst/>
-                </a:prstGeom>
-              </p:spPr>
-            </p:pic>
-          </mc:Fallback>
-        </mc:AlternateContent>
-        <mc:AlternateContent xmlns:mc="http://schemas.openxmlformats.org/markup-compatibility/2006">
-          <mc:Choice xmlns:p14="http://schemas.microsoft.com/office/powerpoint/2010/main" Requires="p14">
-            <p:contentPart p14:bwMode="auto" r:id="rId34">
-              <p14:nvContentPartPr>
-                <p14:cNvPr id="51" name="Ink 50">
-                  <a:extLst>
-                    <a:ext uri="{FF2B5EF4-FFF2-40B4-BE49-F238E27FC236}">
-                      <a16:creationId xmlns:a16="http://schemas.microsoft.com/office/drawing/2014/main" id="{9B04E9B6-D841-5892-E801-6FC22FB23589}"/>
-                    </a:ext>
-                  </a:extLst>
-                </p14:cNvPr>
-                <p14:cNvContentPartPr/>
-                <p14:nvPr/>
-              </p14:nvContentPartPr>
-              <p14:xfrm>
-                <a:off x="4956371" y="2067669"/>
-                <a:ext cx="47520" cy="25200"/>
-              </p14:xfrm>
-            </p:contentPart>
-          </mc:Choice>
-          <mc:Fallback>
-            <p:pic>
-              <p:nvPicPr>
-                <p:cNvPr id="51" name="Ink 50">
-                  <a:extLst>
-                    <a:ext uri="{FF2B5EF4-FFF2-40B4-BE49-F238E27FC236}">
-                      <a16:creationId xmlns:a16="http://schemas.microsoft.com/office/drawing/2014/main" id="{9B04E9B6-D841-5892-E801-6FC22FB23589}"/>
-                    </a:ext>
-                  </a:extLst>
-                </p:cNvPr>
-                <p:cNvPicPr/>
-                <p:nvPr/>
-              </p:nvPicPr>
-              <p:blipFill>
-                <a:blip r:embed="rId35"/>
-                <a:stretch>
-                  <a:fillRect/>
-                </a:stretch>
-              </p:blipFill>
-              <p:spPr>
-                <a:xfrm>
-                  <a:off x="4950251" y="2061549"/>
-                  <a:ext cx="59760" cy="37440"/>
-                </a:xfrm>
-                <a:prstGeom prst="rect">
-                  <a:avLst/>
-                </a:prstGeom>
-              </p:spPr>
-            </p:pic>
-          </mc:Fallback>
-        </mc:AlternateContent>
-      </p:grpSp>
-      <mc:AlternateContent xmlns:mc="http://schemas.openxmlformats.org/markup-compatibility/2006">
-        <mc:Choice xmlns:p14="http://schemas.microsoft.com/office/powerpoint/2010/main" xmlns:aink="http://schemas.microsoft.com/office/drawing/2016/ink" Requires="p14 aink">
-          <p:contentPart p14:bwMode="auto" r:id="rId36">
+      <mc:AlternateContent xmlns:mc="http://schemas.openxmlformats.org/markup-compatibility/2006" xmlns:p14="http://schemas.microsoft.com/office/powerpoint/2010/main" xmlns:aink="http://schemas.microsoft.com/office/drawing/2016/ink">
+        <mc:Choice Requires="p14 aink">
+          <p:contentPart p14:bwMode="auto" r:id="rId3">
             <p14:nvContentPartPr>
               <p14:cNvPr id="54" name="Ink 53">
                 <a:extLst>
@@ -14520,7 +13003,7 @@
             </p14:xfrm>
           </p:contentPart>
         </mc:Choice>
-        <mc:Fallback>
+        <mc:Fallback xmlns="">
           <p:pic>
             <p:nvPicPr>
               <p:cNvPr id="54" name="Ink 53">
@@ -14551,6 +13034,36 @@
           </p:pic>
         </mc:Fallback>
       </mc:AlternateContent>
+      <p:pic>
+        <p:nvPicPr>
+          <p:cNvPr id="8" name="Picture 7">
+            <a:extLst>
+              <a:ext uri="{FF2B5EF4-FFF2-40B4-BE49-F238E27FC236}">
+                <a16:creationId xmlns:a16="http://schemas.microsoft.com/office/drawing/2014/main" id="{6BE0B530-4FE9-5051-E262-405FEDFAF3B8}"/>
+              </a:ext>
+            </a:extLst>
+          </p:cNvPr>
+          <p:cNvPicPr>
+            <a:picLocks noChangeAspect="1"/>
+          </p:cNvPicPr>
+          <p:nvPr/>
+        </p:nvPicPr>
+        <p:blipFill>
+          <a:blip r:embed="rId38"/>
+          <a:stretch>
+            <a:fillRect/>
+          </a:stretch>
+        </p:blipFill>
+        <p:spPr>
+          <a:xfrm>
+            <a:off x="77752" y="513808"/>
+            <a:ext cx="5820692" cy="4629692"/>
+          </a:xfrm>
+          <a:prstGeom prst="rect">
+            <a:avLst/>
+          </a:prstGeom>
+        </p:spPr>
+      </p:pic>
     </p:spTree>
   </p:cSld>
   <p:clrMapOvr>
@@ -14601,36 +13114,6 @@
           </a:p>
         </p:txBody>
       </p:sp>
-      <p:pic>
-        <p:nvPicPr>
-          <p:cNvPr id="6" name="Picture 5">
-            <a:extLst>
-              <a:ext uri="{FF2B5EF4-FFF2-40B4-BE49-F238E27FC236}">
-                <a16:creationId xmlns:a16="http://schemas.microsoft.com/office/drawing/2014/main" id="{6913D2C6-222A-010B-45BF-5CA77EA1F6EB}"/>
-              </a:ext>
-            </a:extLst>
-          </p:cNvPr>
-          <p:cNvPicPr>
-            <a:picLocks noChangeAspect="1"/>
-          </p:cNvPicPr>
-          <p:nvPr/>
-        </p:nvPicPr>
-        <p:blipFill>
-          <a:blip r:embed="rId2"/>
-          <a:stretch>
-            <a:fillRect/>
-          </a:stretch>
-        </p:blipFill>
-        <p:spPr>
-          <a:xfrm>
-            <a:off x="0" y="0"/>
-            <a:ext cx="7000240" cy="5143500"/>
-          </a:xfrm>
-          <a:prstGeom prst="rect">
-            <a:avLst/>
-          </a:prstGeom>
-        </p:spPr>
-      </p:pic>
       <p:sp>
         <p:nvSpPr>
           <p:cNvPr id="4" name="Slide Number Placeholder 3">
@@ -14704,60 +13187,47 @@
           </a:p>
         </p:txBody>
       </p:sp>
-      <p:sp>
-        <p:nvSpPr>
-          <p:cNvPr id="5" name="Rectangle 4">
+      <p:pic>
+        <p:nvPicPr>
+          <p:cNvPr id="7" name="Picture 6">
             <a:extLst>
               <a:ext uri="{FF2B5EF4-FFF2-40B4-BE49-F238E27FC236}">
-                <a16:creationId xmlns:a16="http://schemas.microsoft.com/office/drawing/2014/main" id="{BEFBD5D2-8E31-7FBF-7D5F-CA3B3A45CD38}"/>
+                <a16:creationId xmlns:a16="http://schemas.microsoft.com/office/drawing/2014/main" id="{0E95E2CF-7DDE-54F9-CF1C-6102896FD3F9}"/>
               </a:ext>
             </a:extLst>
           </p:cNvPr>
-          <p:cNvSpPr/>
+          <p:cNvPicPr>
+            <a:picLocks noChangeAspect="1"/>
+          </p:cNvPicPr>
           <p:nvPr/>
-        </p:nvSpPr>
-        <p:spPr>
+        </p:nvPicPr>
+        <p:blipFill>
+          <a:blip r:embed="rId2">
+            <a:extLst>
+              <a:ext uri="{28A0092B-C50C-407E-A947-70E740481C1C}">
+                <a14:useLocalDpi xmlns:a14="http://schemas.microsoft.com/office/drawing/2010/main" val="0"/>
+              </a:ext>
+            </a:extLst>
+          </a:blip>
+          <a:srcRect/>
+          <a:stretch>
+            <a:fillRect/>
+          </a:stretch>
+        </p:blipFill>
+        <p:spPr bwMode="auto">
           <a:xfrm>
-            <a:off x="6879771" y="0"/>
-            <a:ext cx="2373086" cy="5290457"/>
+            <a:off x="58525" y="408868"/>
+            <a:ext cx="6720453" cy="4611273"/>
           </a:xfrm>
           <a:prstGeom prst="rect">
             <a:avLst/>
           </a:prstGeom>
-          <a:solidFill>
-            <a:srgbClr val="FFF2CC"/>
-          </a:solidFill>
+          <a:noFill/>
           <a:ln>
-            <a:solidFill>
-              <a:srgbClr val="FFF2CC"/>
-            </a:solidFill>
+            <a:noFill/>
           </a:ln>
         </p:spPr>
-        <p:style>
-          <a:lnRef idx="2">
-            <a:schemeClr val="accent1">
-              <a:shade val="15000"/>
-            </a:schemeClr>
-          </a:lnRef>
-          <a:fillRef idx="1">
-            <a:schemeClr val="accent1"/>
-          </a:fillRef>
-          <a:effectRef idx="0">
-            <a:schemeClr val="accent1"/>
-          </a:effectRef>
-          <a:fontRef idx="minor">
-            <a:schemeClr val="lt1"/>
-          </a:fontRef>
-        </p:style>
-        <p:txBody>
-          <a:bodyPr rtlCol="0" anchor="ctr"/>
-          <a:lstStyle/>
-          <a:p>
-            <a:pPr algn="ctr"/>
-            <a:endParaRPr lang="en-US"/>
-          </a:p>
-        </p:txBody>
-      </p:sp>
+      </p:pic>
     </p:spTree>
     <p:extLst>
       <p:ext uri="{BB962C8B-B14F-4D97-AF65-F5344CB8AC3E}">

</xml_diff>